<commit_message>
Update AddMultipleCommand developer guide
</commit_message>
<xml_diff>
--- a/docs/diagrams/AddMultipleCommandSequenceDiagram.pptx
+++ b/docs/diagrams/AddMultipleCommandSequenceDiagram.pptx
@@ -10,7 +10,7 @@
   <p:sldIdLst>
     <p:sldId id="269" r:id="rId2"/>
   </p:sldIdLst>
-  <p:sldSz cx="14424025" cy="11645900"/>
+  <p:sldSz cx="14400213" cy="10206038"/>
   <p:notesSz cx="6858000" cy="9144000"/>
   <p:defaultTextStyle>
     <a:defPPr>
@@ -110,12 +110,12 @@
   <p:extLst>
     <p:ext uri="{EFAFB233-063F-42B5-8137-9DF3F51BA10A}">
       <p15:sldGuideLst xmlns:p15="http://schemas.microsoft.com/office/powerpoint/2012/main">
-        <p15:guide id="1" orient="horz" pos="2527" userDrawn="1">
+        <p15:guide id="1" orient="horz" pos="2215" userDrawn="1">
           <p15:clr>
             <a:srgbClr val="A4A3A4"/>
           </p15:clr>
         </p15:guide>
-        <p15:guide id="2" pos="4543" userDrawn="1">
+        <p15:guide id="2" pos="4536" userDrawn="1">
           <p15:clr>
             <a:srgbClr val="A4A3A4"/>
           </p15:clr>
@@ -208,7 +208,7 @@
           <a:p>
             <a:fld id="{F5CC4B3F-88C1-4FFA-B1B6-F41C21DC6924}" type="datetimeFigureOut">
               <a:rPr lang="en-US" smtClean="0"/>
-              <a:t>10/28/17</a:t>
+              <a:t>11/11/17</a:t>
             </a:fld>
             <a:endParaRPr lang="en-US"/>
           </a:p>
@@ -226,8 +226,8 @@
         </p:nvSpPr>
         <p:spPr>
           <a:xfrm>
-            <a:off x="1304925" y="685800"/>
-            <a:ext cx="4248150" cy="3429000"/>
+            <a:off x="1009650" y="685800"/>
+            <a:ext cx="4838700" cy="3429000"/>
           </a:xfrm>
           <a:prstGeom prst="rect">
             <a:avLst/>
@@ -504,8 +504,8 @@
         </p:nvSpPr>
         <p:spPr>
           <a:xfrm>
-            <a:off x="1304925" y="685800"/>
-            <a:ext cx="4248150" cy="3429000"/>
+            <a:off x="1009650" y="685800"/>
+            <a:ext cx="4838700" cy="3429000"/>
           </a:xfrm>
         </p:spPr>
       </p:sp>
@@ -593,8 +593,8 @@
         </p:nvSpPr>
         <p:spPr>
           <a:xfrm>
-            <a:off x="1081802" y="3617782"/>
-            <a:ext cx="12260421" cy="2496320"/>
+            <a:off x="1080018" y="3170492"/>
+            <a:ext cx="12240180" cy="2187683"/>
           </a:xfrm>
         </p:spPr>
         <p:txBody>
@@ -620,8 +620,8 @@
         </p:nvSpPr>
         <p:spPr>
           <a:xfrm>
-            <a:off x="2163604" y="6599344"/>
-            <a:ext cx="10096818" cy="2976174"/>
+            <a:off x="2160034" y="5783423"/>
+            <a:ext cx="10080149" cy="2608209"/>
           </a:xfrm>
         </p:spPr>
         <p:txBody>
@@ -743,7 +743,7 @@
           <a:p>
             <a:fld id="{78C97017-6FC3-485B-9764-EAC9E56C1D49}" type="datetimeFigureOut">
               <a:rPr lang="en-US" smtClean="0"/>
-              <a:t>10/28/17</a:t>
+              <a:t>11/11/17</a:t>
             </a:fld>
             <a:endParaRPr lang="en-US"/>
           </a:p>
@@ -911,7 +911,7 @@
           <a:p>
             <a:fld id="{78C97017-6FC3-485B-9764-EAC9E56C1D49}" type="datetimeFigureOut">
               <a:rPr lang="en-US" smtClean="0"/>
-              <a:t>10/28/17</a:t>
+              <a:t>11/11/17</a:t>
             </a:fld>
             <a:endParaRPr lang="en-US"/>
           </a:p>
@@ -1001,8 +1001,8 @@
         </p:nvSpPr>
         <p:spPr>
           <a:xfrm>
-            <a:off x="10457418" y="466380"/>
-            <a:ext cx="3245406" cy="9936756"/>
+            <a:off x="10440155" y="408719"/>
+            <a:ext cx="3240048" cy="8708207"/>
           </a:xfrm>
         </p:spPr>
         <p:txBody>
@@ -1028,8 +1028,8 @@
         </p:nvSpPr>
         <p:spPr>
           <a:xfrm>
-            <a:off x="721201" y="466380"/>
-            <a:ext cx="9495816" cy="9936756"/>
+            <a:off x="720011" y="408719"/>
+            <a:ext cx="9480140" cy="8708207"/>
           </a:xfrm>
         </p:spPr>
         <p:txBody>
@@ -1089,7 +1089,7 @@
           <a:p>
             <a:fld id="{78C97017-6FC3-485B-9764-EAC9E56C1D49}" type="datetimeFigureOut">
               <a:rPr lang="en-US" smtClean="0"/>
-              <a:t>10/28/17</a:t>
+              <a:t>11/11/17</a:t>
             </a:fld>
             <a:endParaRPr lang="en-US"/>
           </a:p>
@@ -1257,7 +1257,7 @@
           <a:p>
             <a:fld id="{78C97017-6FC3-485B-9764-EAC9E56C1D49}" type="datetimeFigureOut">
               <a:rPr lang="en-US" smtClean="0"/>
-              <a:t>10/28/17</a:t>
+              <a:t>11/11/17</a:t>
             </a:fld>
             <a:endParaRPr lang="en-US"/>
           </a:p>
@@ -1347,8 +1347,8 @@
         </p:nvSpPr>
         <p:spPr>
           <a:xfrm>
-            <a:off x="1139399" y="7483573"/>
-            <a:ext cx="12260421" cy="2313005"/>
+            <a:off x="1137520" y="6558329"/>
+            <a:ext cx="12240180" cy="2027032"/>
           </a:xfrm>
         </p:spPr>
         <p:txBody>
@@ -1378,8 +1378,8 @@
         </p:nvSpPr>
         <p:spPr>
           <a:xfrm>
-            <a:off x="1139399" y="4936030"/>
-            <a:ext cx="12260421" cy="2547540"/>
+            <a:off x="1137520" y="4325755"/>
+            <a:ext cx="12240180" cy="2232570"/>
           </a:xfrm>
         </p:spPr>
         <p:txBody>
@@ -1502,7 +1502,7 @@
           <a:p>
             <a:fld id="{78C97017-6FC3-485B-9764-EAC9E56C1D49}" type="datetimeFigureOut">
               <a:rPr lang="en-US" smtClean="0"/>
-              <a:t>10/28/17</a:t>
+              <a:t>11/11/17</a:t>
             </a:fld>
             <a:endParaRPr lang="en-US"/>
           </a:p>
@@ -1614,8 +1614,8 @@
         </p:nvSpPr>
         <p:spPr>
           <a:xfrm>
-            <a:off x="721201" y="2717381"/>
-            <a:ext cx="6370611" cy="7685756"/>
+            <a:off x="720011" y="2381412"/>
+            <a:ext cx="6360094" cy="6735514"/>
           </a:xfrm>
         </p:spPr>
         <p:txBody>
@@ -1698,8 +1698,8 @@
         </p:nvSpPr>
         <p:spPr>
           <a:xfrm>
-            <a:off x="7332213" y="2717381"/>
-            <a:ext cx="6370611" cy="7685756"/>
+            <a:off x="7320109" y="2381412"/>
+            <a:ext cx="6360094" cy="6735514"/>
           </a:xfrm>
         </p:spPr>
         <p:txBody>
@@ -1787,7 +1787,7 @@
           <a:p>
             <a:fld id="{78C97017-6FC3-485B-9764-EAC9E56C1D49}" type="datetimeFigureOut">
               <a:rPr lang="en-US" smtClean="0"/>
-              <a:t>10/28/17</a:t>
+              <a:t>11/11/17</a:t>
             </a:fld>
             <a:endParaRPr lang="en-US"/>
           </a:p>
@@ -1903,8 +1903,8 @@
         </p:nvSpPr>
         <p:spPr>
           <a:xfrm>
-            <a:off x="721201" y="2606849"/>
-            <a:ext cx="6373116" cy="1086411"/>
+            <a:off x="720010" y="2284548"/>
+            <a:ext cx="6362595" cy="952091"/>
           </a:xfrm>
         </p:spPr>
         <p:txBody>
@@ -1968,8 +1968,8 @@
         </p:nvSpPr>
         <p:spPr>
           <a:xfrm>
-            <a:off x="721201" y="3693260"/>
-            <a:ext cx="6373116" cy="6709872"/>
+            <a:off x="720010" y="3236638"/>
+            <a:ext cx="6362595" cy="5880285"/>
           </a:xfrm>
         </p:spPr>
         <p:txBody>
@@ -2052,8 +2052,8 @@
         </p:nvSpPr>
         <p:spPr>
           <a:xfrm>
-            <a:off x="7327207" y="2606849"/>
-            <a:ext cx="6375619" cy="1086411"/>
+            <a:off x="7315111" y="2284548"/>
+            <a:ext cx="6365094" cy="952091"/>
           </a:xfrm>
         </p:spPr>
         <p:txBody>
@@ -2117,8 +2117,8 @@
         </p:nvSpPr>
         <p:spPr>
           <a:xfrm>
-            <a:off x="7327207" y="3693260"/>
-            <a:ext cx="6375619" cy="6709872"/>
+            <a:off x="7315111" y="3236638"/>
+            <a:ext cx="6365094" cy="5880285"/>
           </a:xfrm>
         </p:spPr>
         <p:txBody>
@@ -2206,7 +2206,7 @@
           <a:p>
             <a:fld id="{78C97017-6FC3-485B-9764-EAC9E56C1D49}" type="datetimeFigureOut">
               <a:rPr lang="en-US" smtClean="0"/>
-              <a:t>10/28/17</a:t>
+              <a:t>11/11/17</a:t>
             </a:fld>
             <a:endParaRPr lang="en-US"/>
           </a:p>
@@ -2323,7 +2323,7 @@
           <a:p>
             <a:fld id="{78C97017-6FC3-485B-9764-EAC9E56C1D49}" type="datetimeFigureOut">
               <a:rPr lang="en-US" smtClean="0"/>
-              <a:t>10/28/17</a:t>
+              <a:t>11/11/17</a:t>
             </a:fld>
             <a:endParaRPr lang="en-US"/>
           </a:p>
@@ -2418,7 +2418,7 @@
           <a:p>
             <a:fld id="{78C97017-6FC3-485B-9764-EAC9E56C1D49}" type="datetimeFigureOut">
               <a:rPr lang="en-US" smtClean="0"/>
-              <a:t>10/28/17</a:t>
+              <a:t>11/11/17</a:t>
             </a:fld>
             <a:endParaRPr lang="en-US"/>
           </a:p>
@@ -2508,8 +2508,8 @@
         </p:nvSpPr>
         <p:spPr>
           <a:xfrm>
-            <a:off x="721204" y="463679"/>
-            <a:ext cx="4745405" cy="1973333"/>
+            <a:off x="720014" y="406353"/>
+            <a:ext cx="4737571" cy="1729356"/>
           </a:xfrm>
         </p:spPr>
         <p:txBody>
@@ -2539,8 +2539,8 @@
         </p:nvSpPr>
         <p:spPr>
           <a:xfrm>
-            <a:off x="5639393" y="463684"/>
-            <a:ext cx="8063431" cy="9939453"/>
+            <a:off x="5630084" y="406358"/>
+            <a:ext cx="8050120" cy="8710571"/>
           </a:xfrm>
         </p:spPr>
         <p:txBody>
@@ -2623,8 +2623,8 @@
         </p:nvSpPr>
         <p:spPr>
           <a:xfrm>
-            <a:off x="721204" y="2437017"/>
-            <a:ext cx="4745405" cy="7966120"/>
+            <a:off x="720014" y="2135712"/>
+            <a:ext cx="4737571" cy="6981214"/>
           </a:xfrm>
         </p:spPr>
         <p:txBody>
@@ -2693,7 +2693,7 @@
           <a:p>
             <a:fld id="{78C97017-6FC3-485B-9764-EAC9E56C1D49}" type="datetimeFigureOut">
               <a:rPr lang="en-US" smtClean="0"/>
-              <a:t>10/28/17</a:t>
+              <a:t>11/11/17</a:t>
             </a:fld>
             <a:endParaRPr lang="en-US"/>
           </a:p>
@@ -2783,8 +2783,8 @@
         </p:nvSpPr>
         <p:spPr>
           <a:xfrm>
-            <a:off x="2827210" y="8152130"/>
-            <a:ext cx="8654415" cy="962405"/>
+            <a:off x="2822544" y="7144228"/>
+            <a:ext cx="8640128" cy="843416"/>
           </a:xfrm>
         </p:spPr>
         <p:txBody>
@@ -2814,8 +2814,8 @@
         </p:nvSpPr>
         <p:spPr>
           <a:xfrm>
-            <a:off x="2827210" y="1040583"/>
-            <a:ext cx="8654415" cy="6987540"/>
+            <a:off x="2822544" y="911929"/>
+            <a:ext cx="8640128" cy="6123623"/>
           </a:xfrm>
         </p:spPr>
         <p:txBody>
@@ -2875,8 +2875,8 @@
         </p:nvSpPr>
         <p:spPr>
           <a:xfrm>
-            <a:off x="2827210" y="9114535"/>
-            <a:ext cx="8654415" cy="1366775"/>
+            <a:off x="2822544" y="7987645"/>
+            <a:ext cx="8640128" cy="1197791"/>
           </a:xfrm>
         </p:spPr>
         <p:txBody>
@@ -2945,7 +2945,7 @@
           <a:p>
             <a:fld id="{78C97017-6FC3-485B-9764-EAC9E56C1D49}" type="datetimeFigureOut">
               <a:rPr lang="en-US" smtClean="0"/>
-              <a:t>10/28/17</a:t>
+              <a:t>11/11/17</a:t>
             </a:fld>
             <a:endParaRPr lang="en-US"/>
           </a:p>
@@ -3040,8 +3040,8 @@
         </p:nvSpPr>
         <p:spPr>
           <a:xfrm>
-            <a:off x="721201" y="466376"/>
-            <a:ext cx="12981623" cy="1940983"/>
+            <a:off x="720011" y="408716"/>
+            <a:ext cx="12960192" cy="1701006"/>
           </a:xfrm>
           <a:prstGeom prst="rect">
             <a:avLst/>
@@ -3072,8 +3072,8 @@
         </p:nvSpPr>
         <p:spPr>
           <a:xfrm>
-            <a:off x="721201" y="2717381"/>
-            <a:ext cx="12981623" cy="7685756"/>
+            <a:off x="720011" y="2381412"/>
+            <a:ext cx="12960192" cy="6735514"/>
           </a:xfrm>
           <a:prstGeom prst="rect">
             <a:avLst/>
@@ -3133,8 +3133,8 @@
         </p:nvSpPr>
         <p:spPr>
           <a:xfrm>
-            <a:off x="721201" y="10794028"/>
-            <a:ext cx="3365606" cy="620036"/>
+            <a:off x="720011" y="9459490"/>
+            <a:ext cx="3360050" cy="543377"/>
           </a:xfrm>
           <a:prstGeom prst="rect">
             <a:avLst/>
@@ -3156,7 +3156,7 @@
           <a:p>
             <a:fld id="{78C97017-6FC3-485B-9764-EAC9E56C1D49}" type="datetimeFigureOut">
               <a:rPr lang="en-US" smtClean="0"/>
-              <a:t>10/28/17</a:t>
+              <a:t>11/11/17</a:t>
             </a:fld>
             <a:endParaRPr lang="en-US"/>
           </a:p>
@@ -3174,8 +3174,8 @@
         </p:nvSpPr>
         <p:spPr>
           <a:xfrm>
-            <a:off x="4928209" y="10794028"/>
-            <a:ext cx="4567608" cy="620036"/>
+            <a:off x="4920074" y="9459490"/>
+            <a:ext cx="4560068" cy="543377"/>
           </a:xfrm>
           <a:prstGeom prst="rect">
             <a:avLst/>
@@ -3211,8 +3211,8 @@
         </p:nvSpPr>
         <p:spPr>
           <a:xfrm>
-            <a:off x="10337218" y="10794028"/>
-            <a:ext cx="3365606" cy="620036"/>
+            <a:off x="10320153" y="9459490"/>
+            <a:ext cx="3360050" cy="543377"/>
           </a:xfrm>
           <a:prstGeom prst="rect">
             <a:avLst/>
@@ -3533,14 +3533,14 @@
       </p:grpSpPr>
       <p:sp>
         <p:nvSpPr>
-          <p:cNvPr id="64" name="Rectangle 65"/>
+          <p:cNvPr id="183" name="Rectangle 65"/>
           <p:cNvSpPr/>
           <p:nvPr/>
         </p:nvSpPr>
         <p:spPr>
           <a:xfrm>
-            <a:off x="3363911" y="2622550"/>
-            <a:ext cx="10401301" cy="8229600"/>
+            <a:off x="2057084" y="378953"/>
+            <a:ext cx="10553222" cy="9448467"/>
           </a:xfrm>
           <a:prstGeom prst="roundRect">
             <a:avLst>
@@ -3600,7 +3600,7 @@
         </p:nvSpPr>
         <p:spPr>
           <a:xfrm>
-            <a:off x="3523160" y="2937896"/>
+            <a:off x="2352076" y="749385"/>
             <a:ext cx="1455629" cy="346760"/>
           </a:xfrm>
           <a:prstGeom prst="rect">
@@ -3669,8 +3669,8 @@
         </p:nvCxnSpPr>
         <p:spPr>
           <a:xfrm>
-            <a:off x="4222541" y="3324274"/>
-            <a:ext cx="30797" cy="7299279"/>
+            <a:off x="3007881" y="1135764"/>
+            <a:ext cx="0" cy="8463056"/>
           </a:xfrm>
           <a:prstGeom prst="line">
             <a:avLst/>
@@ -3706,7 +3706,7 @@
         </p:nvSpPr>
         <p:spPr>
           <a:xfrm>
-            <a:off x="4122956" y="3668316"/>
+            <a:off x="2951872" y="1479808"/>
             <a:ext cx="215711" cy="105607"/>
           </a:xfrm>
           <a:prstGeom prst="rect">
@@ -3753,7 +3753,7 @@
         </p:nvSpPr>
         <p:spPr>
           <a:xfrm>
-            <a:off x="6077200" y="2816972"/>
+            <a:off x="4906114" y="628461"/>
             <a:ext cx="1219200" cy="467684"/>
           </a:xfrm>
           <a:prstGeom prst="rect">
@@ -3825,8 +3825,8 @@
         </p:nvCxnSpPr>
         <p:spPr>
           <a:xfrm>
-            <a:off x="6690599" y="3301567"/>
-            <a:ext cx="0" cy="1482984"/>
+            <a:off x="5508349" y="1113056"/>
+            <a:ext cx="0" cy="7343896"/>
           </a:xfrm>
           <a:prstGeom prst="line">
             <a:avLst/>
@@ -3862,8 +3862,8 @@
         </p:nvSpPr>
         <p:spPr>
           <a:xfrm>
-            <a:off x="6618592" y="3759762"/>
-            <a:ext cx="152398" cy="4501591"/>
+            <a:off x="5447506" y="1571251"/>
+            <a:ext cx="152398" cy="6552000"/>
           </a:xfrm>
           <a:prstGeom prst="rect">
             <a:avLst/>
@@ -3912,8 +3912,8 @@
         </p:nvCxnSpPr>
         <p:spPr>
           <a:xfrm>
-            <a:off x="13001714" y="4099344"/>
-            <a:ext cx="1512" cy="6061197"/>
+            <a:off x="9941808" y="7659063"/>
+            <a:ext cx="0" cy="1939759"/>
           </a:xfrm>
           <a:prstGeom prst="line">
             <a:avLst/>
@@ -3949,7 +3949,7 @@
         </p:nvSpPr>
         <p:spPr>
           <a:xfrm>
-            <a:off x="12925514" y="3994150"/>
+            <a:off x="7965157" y="2020513"/>
             <a:ext cx="162820" cy="304683"/>
           </a:xfrm>
           <a:prstGeom prst="rect">
@@ -3996,7 +3996,7 @@
         </p:nvCxnSpPr>
         <p:spPr>
           <a:xfrm>
-            <a:off x="3059115" y="3655949"/>
+            <a:off x="1888031" y="1467438"/>
             <a:ext cx="1119851" cy="0"/>
           </a:xfrm>
           <a:prstGeom prst="straightConnector1">
@@ -4032,7 +4032,7 @@
         </p:nvSpPr>
         <p:spPr>
           <a:xfrm>
-            <a:off x="2678112" y="3384550"/>
+            <a:off x="1507026" y="1196039"/>
             <a:ext cx="1424846" cy="215444"/>
           </a:xfrm>
           <a:prstGeom prst="rect">
@@ -4061,13 +4061,15 @@
       <p:cxnSp>
         <p:nvCxnSpPr>
           <p:cNvPr id="28" name="Straight Arrow Connector 27"/>
-          <p:cNvCxnSpPr/>
+          <p:cNvCxnSpPr>
+            <a:endCxn id="48" idx="1"/>
+          </p:cNvCxnSpPr>
           <p:nvPr/>
         </p:nvCxnSpPr>
         <p:spPr>
-          <a:xfrm>
-            <a:off x="6770990" y="3987430"/>
-            <a:ext cx="5622622" cy="4952"/>
+          <a:xfrm flipV="1">
+            <a:off x="5599905" y="1795704"/>
+            <a:ext cx="1657830" cy="3218"/>
           </a:xfrm>
           <a:prstGeom prst="straightConnector1">
             <a:avLst/>
@@ -4102,7 +4104,7 @@
         </p:nvSpPr>
         <p:spPr>
           <a:xfrm>
-            <a:off x="4890726" y="8337550"/>
+            <a:off x="8181870" y="8241508"/>
             <a:ext cx="855809" cy="215444"/>
           </a:xfrm>
           <a:prstGeom prst="rect">
@@ -4141,9 +4143,9 @@
           <p:nvPr/>
         </p:nvCxnSpPr>
         <p:spPr>
-          <a:xfrm>
-            <a:off x="6784617" y="4298833"/>
-            <a:ext cx="6133501" cy="117"/>
+          <a:xfrm flipV="1">
+            <a:off x="5613530" y="2306842"/>
+            <a:ext cx="2316848" cy="88"/>
           </a:xfrm>
           <a:prstGeom prst="straightConnector1">
             <a:avLst/>
@@ -4182,7 +4184,7 @@
         </p:nvCxnSpPr>
         <p:spPr>
           <a:xfrm>
-            <a:off x="4331366" y="8261350"/>
+            <a:off x="3160282" y="8074027"/>
             <a:ext cx="2348067" cy="0"/>
           </a:xfrm>
           <a:prstGeom prst="straightConnector1">
@@ -4220,7 +4222,7 @@
         </p:nvCxnSpPr>
         <p:spPr>
           <a:xfrm>
-            <a:off x="2967962" y="10166350"/>
+            <a:off x="1727279" y="9370220"/>
             <a:ext cx="1196051" cy="0"/>
           </a:xfrm>
           <a:prstGeom prst="straightConnector1">
@@ -4258,7 +4260,7 @@
         </p:nvSpPr>
         <p:spPr>
           <a:xfrm>
-            <a:off x="4525204" y="3500100"/>
+            <a:off x="3354121" y="1311589"/>
             <a:ext cx="2034871" cy="215444"/>
           </a:xfrm>
           <a:prstGeom prst="rect">
@@ -4296,14 +4298,14 @@
       </p:sp>
       <p:sp>
         <p:nvSpPr>
-          <p:cNvPr id="82" name="TextBox 81"/>
+          <p:cNvPr id="83" name="TextBox 82"/>
           <p:cNvSpPr txBox="1"/>
           <p:nvPr/>
         </p:nvSpPr>
         <p:spPr>
           <a:xfrm>
-            <a:off x="11382230" y="9327470"/>
-            <a:ext cx="621216" cy="215444"/>
+            <a:off x="3652065" y="8753498"/>
+            <a:ext cx="762000" cy="215444"/>
           </a:xfrm>
           <a:prstGeom prst="rect">
             <a:avLst/>
@@ -4336,14 +4338,14 @@
       </p:sp>
       <p:sp>
         <p:nvSpPr>
-          <p:cNvPr id="83" name="TextBox 82"/>
+          <p:cNvPr id="93" name="TextBox 92"/>
           <p:cNvSpPr txBox="1"/>
           <p:nvPr/>
         </p:nvSpPr>
         <p:spPr>
           <a:xfrm>
-            <a:off x="3232232" y="9921251"/>
-            <a:ext cx="762000" cy="215444"/>
+            <a:off x="4193724" y="7846220"/>
+            <a:ext cx="220343" cy="215444"/>
           </a:xfrm>
           <a:prstGeom prst="rect">
             <a:avLst/>
@@ -4369,21 +4371,1177 @@
           <a:p>
             <a:r>
               <a:rPr lang="en-US" dirty="0"/>
-              <a:t>result</a:t>
-            </a:r>
-          </a:p>
-        </p:txBody>
-      </p:sp>
-      <p:sp>
-        <p:nvSpPr>
-          <p:cNvPr id="93" name="TextBox 92"/>
+              <a:t>m</a:t>
+            </a:r>
+          </a:p>
+        </p:txBody>
+      </p:sp>
+      <p:sp>
+        <p:nvSpPr>
+          <p:cNvPr id="19" name="Rectangle 62"/>
+          <p:cNvSpPr/>
+          <p:nvPr/>
+        </p:nvSpPr>
+        <p:spPr>
+          <a:xfrm>
+            <a:off x="9333708" y="6868067"/>
+            <a:ext cx="1216203" cy="790994"/>
+          </a:xfrm>
+          <a:prstGeom prst="rect">
+            <a:avLst/>
+          </a:prstGeom>
+          <a:solidFill>
+            <a:srgbClr val="0070C0"/>
+          </a:solidFill>
+          <a:ln w="19050">
+            <a:solidFill>
+              <a:srgbClr val="0070C0"/>
+            </a:solidFill>
+          </a:ln>
+          <a:effectLst/>
+        </p:spPr>
+        <p:style>
+          <a:lnRef idx="1">
+            <a:schemeClr val="accent2"/>
+          </a:lnRef>
+          <a:fillRef idx="2">
+            <a:schemeClr val="accent2"/>
+          </a:fillRef>
+          <a:effectRef idx="1">
+            <a:schemeClr val="accent2"/>
+          </a:effectRef>
+          <a:fontRef idx="minor">
+            <a:schemeClr val="dk1"/>
+          </a:fontRef>
+        </p:style>
+        <p:txBody>
+          <a:bodyPr rtlCol="0" anchor="ctr"/>
+          <a:lstStyle/>
+          <a:p>
+            <a:pPr algn="ctr"/>
+            <a:r>
+              <a:rPr lang="en-US" sz="1600" dirty="0">
+                <a:solidFill>
+                  <a:schemeClr val="bg1"/>
+                </a:solidFill>
+              </a:rPr>
+              <a:t>m:</a:t>
+            </a:r>
+          </a:p>
+          <a:p>
+            <a:pPr algn="ctr"/>
+            <a:r>
+              <a:rPr lang="en-US" sz="1600" dirty="0" err="1">
+                <a:solidFill>
+                  <a:schemeClr val="bg1"/>
+                </a:solidFill>
+              </a:rPr>
+              <a:t>AddMultiple</a:t>
+            </a:r>
+            <a:r>
+              <a:rPr lang="en-US" sz="1600" dirty="0">
+                <a:solidFill>
+                  <a:schemeClr val="bg1"/>
+                </a:solidFill>
+              </a:rPr>
+              <a:t/>
+            </a:r>
+            <a:br>
+              <a:rPr lang="en-US" sz="1600" dirty="0">
+                <a:solidFill>
+                  <a:schemeClr val="bg1"/>
+                </a:solidFill>
+              </a:rPr>
+            </a:br>
+            <a:r>
+              <a:rPr lang="en-US" sz="1600" dirty="0">
+                <a:solidFill>
+                  <a:schemeClr val="bg1"/>
+                </a:solidFill>
+              </a:rPr>
+              <a:t>Command</a:t>
+            </a:r>
+            <a:endParaRPr lang="en-SG" sz="1600" dirty="0">
+              <a:solidFill>
+                <a:schemeClr val="bg1"/>
+              </a:solidFill>
+            </a:endParaRPr>
+          </a:p>
+        </p:txBody>
+      </p:sp>
+      <p:cxnSp>
+        <p:nvCxnSpPr>
+          <p:cNvPr id="67" name="Straight Arrow Connector 66">
+            <a:extLst>
+              <a:ext uri="{FF2B5EF4-FFF2-40B4-BE49-F238E27FC236}">
+                <a16:creationId xmlns:a16="http://schemas.microsoft.com/office/drawing/2014/main" xmlns="" id="{D881596E-177C-4FDC-8E60-CAB90B3D5FAB}"/>
+              </a:ext>
+            </a:extLst>
+          </p:cNvPr>
+          <p:cNvCxnSpPr>
+            <a:cxnSpLocks/>
+          </p:cNvCxnSpPr>
+          <p:nvPr/>
+        </p:nvCxnSpPr>
+        <p:spPr>
+          <a:xfrm>
+            <a:off x="3177176" y="1569363"/>
+            <a:ext cx="2256705" cy="1"/>
+          </a:xfrm>
+          <a:prstGeom prst="straightConnector1">
+            <a:avLst/>
+          </a:prstGeom>
+          <a:ln w="19050">
+            <a:solidFill>
+              <a:srgbClr val="0070C0"/>
+            </a:solidFill>
+            <a:tailEnd type="arrow"/>
+          </a:ln>
+        </p:spPr>
+        <p:style>
+          <a:lnRef idx="1">
+            <a:schemeClr val="accent1"/>
+          </a:lnRef>
+          <a:fillRef idx="0">
+            <a:schemeClr val="accent1"/>
+          </a:fillRef>
+          <a:effectRef idx="0">
+            <a:schemeClr val="accent1"/>
+          </a:effectRef>
+          <a:fontRef idx="minor">
+            <a:schemeClr val="tx1"/>
+          </a:fontRef>
+        </p:style>
+      </p:cxnSp>
+      <p:cxnSp>
+        <p:nvCxnSpPr>
+          <p:cNvPr id="69" name="Straight Arrow Connector 68">
+            <a:extLst>
+              <a:ext uri="{FF2B5EF4-FFF2-40B4-BE49-F238E27FC236}">
+                <a16:creationId xmlns:a16="http://schemas.microsoft.com/office/drawing/2014/main" xmlns="" id="{7C9F21BC-13A9-471F-825A-2621FD36355F}"/>
+              </a:ext>
+            </a:extLst>
+          </p:cNvPr>
+          <p:cNvCxnSpPr>
+            <a:cxnSpLocks/>
+          </p:cNvCxnSpPr>
+          <p:nvPr/>
+        </p:nvCxnSpPr>
+        <p:spPr>
+          <a:xfrm>
+            <a:off x="3177175" y="9000784"/>
+            <a:ext cx="6746526" cy="0"/>
+          </a:xfrm>
+          <a:prstGeom prst="straightConnector1">
+            <a:avLst/>
+          </a:prstGeom>
+          <a:ln w="19050">
+            <a:solidFill>
+              <a:srgbClr val="0070C0"/>
+            </a:solidFill>
+            <a:prstDash val="sysDash"/>
+            <a:headEnd type="arrow" w="med" len="med"/>
+            <a:tailEnd type="none" w="med" len="med"/>
+          </a:ln>
+        </p:spPr>
+        <p:style>
+          <a:lnRef idx="1">
+            <a:schemeClr val="accent1"/>
+          </a:lnRef>
+          <a:fillRef idx="0">
+            <a:schemeClr val="accent1"/>
+          </a:fillRef>
+          <a:effectRef idx="0">
+            <a:schemeClr val="accent1"/>
+          </a:effectRef>
+          <a:fontRef idx="minor">
+            <a:schemeClr val="tx1"/>
+          </a:fontRef>
+        </p:style>
+      </p:cxnSp>
+      <p:cxnSp>
+        <p:nvCxnSpPr>
+          <p:cNvPr id="41" name="Straight Arrow Connector 40"/>
+          <p:cNvCxnSpPr/>
+          <p:nvPr/>
+        </p:nvCxnSpPr>
+        <p:spPr>
+          <a:xfrm flipV="1">
+            <a:off x="8176907" y="7283024"/>
+            <a:ext cx="1166291" cy="0"/>
+          </a:xfrm>
+          <a:prstGeom prst="straightConnector1">
+            <a:avLst/>
+          </a:prstGeom>
+          <a:ln w="19050">
+            <a:solidFill>
+              <a:srgbClr val="0070C0"/>
+            </a:solidFill>
+            <a:tailEnd type="arrow"/>
+          </a:ln>
+        </p:spPr>
+        <p:style>
+          <a:lnRef idx="1">
+            <a:schemeClr val="accent1"/>
+          </a:lnRef>
+          <a:fillRef idx="0">
+            <a:schemeClr val="accent1"/>
+          </a:fillRef>
+          <a:effectRef idx="0">
+            <a:schemeClr val="accent1"/>
+          </a:effectRef>
+          <a:fontRef idx="minor">
+            <a:schemeClr val="tx1"/>
+          </a:fontRef>
+        </p:style>
+      </p:cxnSp>
+      <p:sp>
+        <p:nvSpPr>
+          <p:cNvPr id="48" name="Rectangle 62"/>
+          <p:cNvSpPr/>
+          <p:nvPr/>
+        </p:nvSpPr>
+        <p:spPr>
+          <a:xfrm>
+            <a:off x="7257735" y="1561862"/>
+            <a:ext cx="1553822" cy="467684"/>
+          </a:xfrm>
+          <a:prstGeom prst="rect">
+            <a:avLst/>
+          </a:prstGeom>
+          <a:solidFill>
+            <a:srgbClr val="0070C0"/>
+          </a:solidFill>
+          <a:ln w="19050">
+            <a:solidFill>
+              <a:srgbClr val="0070C0"/>
+            </a:solidFill>
+          </a:ln>
+          <a:effectLst/>
+        </p:spPr>
+        <p:style>
+          <a:lnRef idx="1">
+            <a:schemeClr val="accent2"/>
+          </a:lnRef>
+          <a:fillRef idx="2">
+            <a:schemeClr val="accent2"/>
+          </a:fillRef>
+          <a:effectRef idx="1">
+            <a:schemeClr val="accent2"/>
+          </a:effectRef>
+          <a:fontRef idx="minor">
+            <a:schemeClr val="dk1"/>
+          </a:fontRef>
+        </p:style>
+        <p:txBody>
+          <a:bodyPr rtlCol="0" anchor="ctr"/>
+          <a:lstStyle/>
+          <a:p>
+            <a:pPr algn="ctr"/>
+            <a:r>
+              <a:rPr lang="en-US" sz="1600" dirty="0">
+                <a:solidFill>
+                  <a:schemeClr val="bg1"/>
+                </a:solidFill>
+              </a:rPr>
+              <a:t>:</a:t>
+            </a:r>
+            <a:r>
+              <a:rPr lang="en-US" sz="1600" dirty="0" err="1">
+                <a:solidFill>
+                  <a:schemeClr val="bg1"/>
+                </a:solidFill>
+              </a:rPr>
+              <a:t>AddMultiple</a:t>
+            </a:r>
+            <a:endParaRPr lang="en-US" sz="1600" dirty="0">
+              <a:solidFill>
+                <a:schemeClr val="bg1"/>
+              </a:solidFill>
+            </a:endParaRPr>
+          </a:p>
+          <a:p>
+            <a:pPr algn="ctr"/>
+            <a:r>
+              <a:rPr lang="en-US" sz="1600" dirty="0" err="1">
+                <a:solidFill>
+                  <a:schemeClr val="bg1"/>
+                </a:solidFill>
+              </a:rPr>
+              <a:t>CommandParser</a:t>
+            </a:r>
+            <a:endParaRPr lang="en-US" sz="1600" dirty="0">
+              <a:solidFill>
+                <a:schemeClr val="bg1"/>
+              </a:solidFill>
+            </a:endParaRPr>
+          </a:p>
+        </p:txBody>
+      </p:sp>
+      <p:cxnSp>
+        <p:nvCxnSpPr>
+          <p:cNvPr id="56" name="Straight Arrow Connector 55"/>
+          <p:cNvCxnSpPr/>
+          <p:nvPr/>
+        </p:nvCxnSpPr>
+        <p:spPr>
+          <a:xfrm flipV="1">
+            <a:off x="8154804" y="2847597"/>
+            <a:ext cx="754449" cy="4561"/>
+          </a:xfrm>
+          <a:prstGeom prst="straightConnector1">
+            <a:avLst/>
+          </a:prstGeom>
+          <a:ln w="19050">
+            <a:solidFill>
+              <a:srgbClr val="0070C0"/>
+            </a:solidFill>
+            <a:tailEnd type="arrow"/>
+          </a:ln>
+        </p:spPr>
+        <p:style>
+          <a:lnRef idx="1">
+            <a:schemeClr val="accent1"/>
+          </a:lnRef>
+          <a:fillRef idx="0">
+            <a:schemeClr val="accent1"/>
+          </a:fillRef>
+          <a:effectRef idx="0">
+            <a:schemeClr val="accent1"/>
+          </a:effectRef>
+          <a:fontRef idx="minor">
+            <a:schemeClr val="tx1"/>
+          </a:fontRef>
+        </p:style>
+      </p:cxnSp>
+      <p:sp>
+        <p:nvSpPr>
+          <p:cNvPr id="57" name="Rectangle 62"/>
+          <p:cNvSpPr/>
+          <p:nvPr/>
+        </p:nvSpPr>
+        <p:spPr>
+          <a:xfrm>
+            <a:off x="8909253" y="2669238"/>
+            <a:ext cx="692761" cy="387290"/>
+          </a:xfrm>
+          <a:prstGeom prst="rect">
+            <a:avLst/>
+          </a:prstGeom>
+          <a:solidFill>
+            <a:srgbClr val="0070C0"/>
+          </a:solidFill>
+          <a:ln w="19050">
+            <a:solidFill>
+              <a:srgbClr val="0070C0"/>
+            </a:solidFill>
+          </a:ln>
+          <a:effectLst/>
+        </p:spPr>
+        <p:style>
+          <a:lnRef idx="1">
+            <a:schemeClr val="accent2"/>
+          </a:lnRef>
+          <a:fillRef idx="2">
+            <a:schemeClr val="accent2"/>
+          </a:fillRef>
+          <a:effectRef idx="1">
+            <a:schemeClr val="accent2"/>
+          </a:effectRef>
+          <a:fontRef idx="minor">
+            <a:schemeClr val="dk1"/>
+          </a:fontRef>
+        </p:style>
+        <p:txBody>
+          <a:bodyPr rtlCol="0" anchor="ctr"/>
+          <a:lstStyle/>
+          <a:p>
+            <a:pPr algn="ctr"/>
+            <a:r>
+              <a:rPr lang="en-US" sz="1600" dirty="0">
+                <a:solidFill>
+                  <a:schemeClr val="bg1"/>
+                </a:solidFill>
+              </a:rPr>
+              <a:t>f :File</a:t>
+            </a:r>
+            <a:endParaRPr lang="en-SG" sz="1600" dirty="0">
+              <a:solidFill>
+                <a:schemeClr val="bg1"/>
+              </a:solidFill>
+            </a:endParaRPr>
+          </a:p>
+        </p:txBody>
+      </p:sp>
+      <p:sp>
+        <p:nvSpPr>
+          <p:cNvPr id="59" name="Rectangle 58"/>
+          <p:cNvSpPr/>
+          <p:nvPr/>
+        </p:nvSpPr>
+        <p:spPr>
+          <a:xfrm>
+            <a:off x="9176752" y="2996670"/>
+            <a:ext cx="152400" cy="247418"/>
+          </a:xfrm>
+          <a:prstGeom prst="rect">
+            <a:avLst/>
+          </a:prstGeom>
+          <a:solidFill>
+            <a:srgbClr val="0070C0"/>
+          </a:solidFill>
+          <a:ln>
+            <a:solidFill>
+              <a:srgbClr val="0070C0"/>
+            </a:solidFill>
+          </a:ln>
+          <a:effectLst/>
+        </p:spPr>
+        <p:style>
+          <a:lnRef idx="1">
+            <a:schemeClr val="accent3"/>
+          </a:lnRef>
+          <a:fillRef idx="2">
+            <a:schemeClr val="accent3"/>
+          </a:fillRef>
+          <a:effectRef idx="1">
+            <a:schemeClr val="accent3"/>
+          </a:effectRef>
+          <a:fontRef idx="minor">
+            <a:schemeClr val="dk1"/>
+          </a:fontRef>
+        </p:style>
+        <p:txBody>
+          <a:bodyPr rtlCol="0" anchor="ctr"/>
+          <a:lstStyle/>
+          <a:p>
+            <a:pPr algn="ctr"/>
+            <a:endParaRPr lang="en-SG" sz="1400"/>
+          </a:p>
+        </p:txBody>
+      </p:sp>
+      <p:cxnSp>
+        <p:nvCxnSpPr>
+          <p:cNvPr id="60" name="Straight Arrow Connector 59"/>
+          <p:cNvCxnSpPr/>
+          <p:nvPr/>
+        </p:nvCxnSpPr>
+        <p:spPr>
+          <a:xfrm>
+            <a:off x="8129442" y="3244084"/>
+            <a:ext cx="1196051" cy="0"/>
+          </a:xfrm>
+          <a:prstGeom prst="straightConnector1">
+            <a:avLst/>
+          </a:prstGeom>
+          <a:ln w="19050">
+            <a:solidFill>
+              <a:schemeClr val="accent1"/>
+            </a:solidFill>
+            <a:prstDash val="sysDash"/>
+            <a:headEnd type="arrow" w="med" len="med"/>
+            <a:tailEnd type="none" w="med" len="med"/>
+          </a:ln>
+        </p:spPr>
+        <p:style>
+          <a:lnRef idx="1">
+            <a:schemeClr val="accent1"/>
+          </a:lnRef>
+          <a:fillRef idx="0">
+            <a:schemeClr val="accent1"/>
+          </a:fillRef>
+          <a:effectRef idx="0">
+            <a:schemeClr val="accent1"/>
+          </a:effectRef>
+          <a:fontRef idx="minor">
+            <a:schemeClr val="tx1"/>
+          </a:fontRef>
+        </p:style>
+      </p:cxnSp>
+      <p:cxnSp>
+        <p:nvCxnSpPr>
+          <p:cNvPr id="61" name="Straight Arrow Connector 60"/>
+          <p:cNvCxnSpPr>
+            <a:cxnSpLocks/>
+          </p:cNvCxnSpPr>
+          <p:nvPr/>
+        </p:nvCxnSpPr>
+        <p:spPr>
+          <a:xfrm flipV="1">
+            <a:off x="8124516" y="3804146"/>
+            <a:ext cx="1679595" cy="3474"/>
+          </a:xfrm>
+          <a:prstGeom prst="straightConnector1">
+            <a:avLst/>
+          </a:prstGeom>
+          <a:ln w="19050">
+            <a:solidFill>
+              <a:srgbClr val="0070C0"/>
+            </a:solidFill>
+            <a:tailEnd type="arrow"/>
+          </a:ln>
+        </p:spPr>
+        <p:style>
+          <a:lnRef idx="1">
+            <a:schemeClr val="accent1"/>
+          </a:lnRef>
+          <a:fillRef idx="0">
+            <a:schemeClr val="accent1"/>
+          </a:fillRef>
+          <a:effectRef idx="0">
+            <a:schemeClr val="accent1"/>
+          </a:effectRef>
+          <a:fontRef idx="minor">
+            <a:schemeClr val="tx1"/>
+          </a:fontRef>
+        </p:style>
+      </p:cxnSp>
+      <p:sp>
+        <p:nvSpPr>
+          <p:cNvPr id="68" name="Rectangle 62"/>
+          <p:cNvSpPr/>
+          <p:nvPr/>
+        </p:nvSpPr>
+        <p:spPr>
+          <a:xfrm>
+            <a:off x="9449690" y="628463"/>
+            <a:ext cx="874616" cy="432035"/>
+          </a:xfrm>
+          <a:prstGeom prst="rect">
+            <a:avLst/>
+          </a:prstGeom>
+          <a:solidFill>
+            <a:srgbClr val="0070C0"/>
+          </a:solidFill>
+          <a:ln w="19050">
+            <a:solidFill>
+              <a:srgbClr val="0070C0"/>
+            </a:solidFill>
+          </a:ln>
+          <a:effectLst/>
+        </p:spPr>
+        <p:style>
+          <a:lnRef idx="1">
+            <a:schemeClr val="accent2"/>
+          </a:lnRef>
+          <a:fillRef idx="2">
+            <a:schemeClr val="accent2"/>
+          </a:fillRef>
+          <a:effectRef idx="1">
+            <a:schemeClr val="accent2"/>
+          </a:effectRef>
+          <a:fontRef idx="minor">
+            <a:schemeClr val="dk1"/>
+          </a:fontRef>
+        </p:style>
+        <p:txBody>
+          <a:bodyPr rtlCol="0" anchor="ctr"/>
+          <a:lstStyle/>
+          <a:p>
+            <a:pPr algn="ctr"/>
+            <a:r>
+              <a:rPr lang="en-US" sz="1600" dirty="0">
+                <a:solidFill>
+                  <a:schemeClr val="bg1"/>
+                </a:solidFill>
+              </a:rPr>
+              <a:t>:</a:t>
+            </a:r>
+            <a:r>
+              <a:rPr lang="en-US" sz="1600" dirty="0" err="1">
+                <a:solidFill>
+                  <a:schemeClr val="bg1"/>
+                </a:solidFill>
+              </a:rPr>
+              <a:t>FileUtil</a:t>
+            </a:r>
+            <a:endParaRPr lang="en-SG" sz="1600" dirty="0">
+              <a:solidFill>
+                <a:schemeClr val="bg1"/>
+              </a:solidFill>
+            </a:endParaRPr>
+          </a:p>
+        </p:txBody>
+      </p:sp>
+      <p:cxnSp>
+        <p:nvCxnSpPr>
+          <p:cNvPr id="70" name="Straight Connector 69"/>
+          <p:cNvCxnSpPr>
+            <a:cxnSpLocks/>
+            <a:stCxn id="21" idx="2"/>
+          </p:cNvCxnSpPr>
+          <p:nvPr/>
+        </p:nvCxnSpPr>
+        <p:spPr>
+          <a:xfrm>
+            <a:off x="8046567" y="2325196"/>
+            <a:ext cx="22977" cy="5916312"/>
+          </a:xfrm>
+          <a:prstGeom prst="line">
+            <a:avLst/>
+          </a:prstGeom>
+          <a:ln w="19050">
+            <a:solidFill>
+              <a:srgbClr val="0070C0"/>
+            </a:solidFill>
+            <a:prstDash val="sysDash"/>
+          </a:ln>
+          <a:effectLst/>
+        </p:spPr>
+        <p:style>
+          <a:lnRef idx="1">
+            <a:schemeClr val="accent1"/>
+          </a:lnRef>
+          <a:fillRef idx="2">
+            <a:schemeClr val="accent1"/>
+          </a:fillRef>
+          <a:effectRef idx="1">
+            <a:schemeClr val="accent1"/>
+          </a:effectRef>
+          <a:fontRef idx="minor">
+            <a:schemeClr val="dk1"/>
+          </a:fontRef>
+        </p:style>
+      </p:cxnSp>
+      <p:sp>
+        <p:nvSpPr>
+          <p:cNvPr id="71" name="Rectangle 70"/>
+          <p:cNvSpPr/>
+          <p:nvPr/>
+        </p:nvSpPr>
+        <p:spPr>
+          <a:xfrm>
+            <a:off x="9808897" y="3758195"/>
+            <a:ext cx="143342" cy="472949"/>
+          </a:xfrm>
+          <a:prstGeom prst="rect">
+            <a:avLst/>
+          </a:prstGeom>
+          <a:solidFill>
+            <a:srgbClr val="0070C0"/>
+          </a:solidFill>
+          <a:ln>
+            <a:solidFill>
+              <a:srgbClr val="0070C0"/>
+            </a:solidFill>
+          </a:ln>
+          <a:effectLst/>
+        </p:spPr>
+        <p:style>
+          <a:lnRef idx="1">
+            <a:schemeClr val="accent3"/>
+          </a:lnRef>
+          <a:fillRef idx="2">
+            <a:schemeClr val="accent3"/>
+          </a:fillRef>
+          <a:effectRef idx="1">
+            <a:schemeClr val="accent3"/>
+          </a:effectRef>
+          <a:fontRef idx="minor">
+            <a:schemeClr val="dk1"/>
+          </a:fontRef>
+        </p:style>
+        <p:txBody>
+          <a:bodyPr rtlCol="0" anchor="ctr"/>
+          <a:lstStyle/>
+          <a:p>
+            <a:pPr algn="ctr"/>
+            <a:endParaRPr lang="en-SG" sz="1400"/>
+          </a:p>
+        </p:txBody>
+      </p:sp>
+      <p:cxnSp>
+        <p:nvCxnSpPr>
+          <p:cNvPr id="73" name="Straight Arrow Connector 72"/>
+          <p:cNvCxnSpPr>
+            <a:endCxn id="71" idx="2"/>
+          </p:cNvCxnSpPr>
+          <p:nvPr/>
+        </p:nvCxnSpPr>
+        <p:spPr>
+          <a:xfrm>
+            <a:off x="8141971" y="4221605"/>
+            <a:ext cx="1738599" cy="9539"/>
+          </a:xfrm>
+          <a:prstGeom prst="straightConnector1">
+            <a:avLst/>
+          </a:prstGeom>
+          <a:ln w="19050">
+            <a:solidFill>
+              <a:schemeClr val="accent1"/>
+            </a:solidFill>
+            <a:prstDash val="sysDash"/>
+            <a:headEnd type="arrow" w="med" len="med"/>
+            <a:tailEnd type="none" w="med" len="med"/>
+          </a:ln>
+        </p:spPr>
+        <p:style>
+          <a:lnRef idx="1">
+            <a:schemeClr val="accent1"/>
+          </a:lnRef>
+          <a:fillRef idx="0">
+            <a:schemeClr val="accent1"/>
+          </a:fillRef>
+          <a:effectRef idx="0">
+            <a:schemeClr val="accent1"/>
+          </a:effectRef>
+          <a:fontRef idx="minor">
+            <a:schemeClr val="tx1"/>
+          </a:fontRef>
+        </p:style>
+      </p:cxnSp>
+      <p:sp>
+        <p:nvSpPr>
+          <p:cNvPr id="36" name="Rectangle 35"/>
+          <p:cNvSpPr/>
+          <p:nvPr/>
+        </p:nvSpPr>
+        <p:spPr>
+          <a:xfrm>
+            <a:off x="6773712" y="4361069"/>
+            <a:ext cx="2675979" cy="775419"/>
+          </a:xfrm>
+          <a:prstGeom prst="rect">
+            <a:avLst/>
+          </a:prstGeom>
+          <a:noFill/>
+        </p:spPr>
+        <p:style>
+          <a:lnRef idx="2">
+            <a:schemeClr val="accent1">
+              <a:shade val="50000"/>
+            </a:schemeClr>
+          </a:lnRef>
+          <a:fillRef idx="1">
+            <a:schemeClr val="accent1"/>
+          </a:fillRef>
+          <a:effectRef idx="0">
+            <a:schemeClr val="accent1"/>
+          </a:effectRef>
+          <a:fontRef idx="minor">
+            <a:schemeClr val="lt1"/>
+          </a:fontRef>
+        </p:style>
+        <p:txBody>
+          <a:bodyPr rot="0" spcFirstLastPara="0" vertOverflow="overflow" horzOverflow="overflow" vert="horz" wrap="square" lIns="91440" tIns="45720" rIns="91440" bIns="45720" numCol="1" spcCol="0" rtlCol="0" fromWordArt="0" anchor="ctr" anchorCtr="0" forceAA="0" compatLnSpc="1">
+            <a:prstTxWarp prst="textNoShape">
+              <a:avLst/>
+            </a:prstTxWarp>
+            <a:noAutofit/>
+          </a:bodyPr>
+          <a:lstStyle/>
+          <a:p>
+            <a:pPr algn="ctr"/>
+            <a:endParaRPr lang="en-US"/>
+          </a:p>
+        </p:txBody>
+      </p:sp>
+      <p:cxnSp>
+        <p:nvCxnSpPr>
+          <p:cNvPr id="76" name="Straight Arrow Connector 75"/>
+          <p:cNvCxnSpPr>
+            <a:cxnSpLocks/>
+          </p:cNvCxnSpPr>
+          <p:nvPr/>
+        </p:nvCxnSpPr>
+        <p:spPr>
+          <a:xfrm>
+            <a:off x="8069546" y="4702930"/>
+            <a:ext cx="1717037" cy="3040"/>
+          </a:xfrm>
+          <a:prstGeom prst="straightConnector1">
+            <a:avLst/>
+          </a:prstGeom>
+          <a:ln w="19050">
+            <a:solidFill>
+              <a:srgbClr val="0070C0"/>
+            </a:solidFill>
+            <a:tailEnd type="arrow"/>
+          </a:ln>
+        </p:spPr>
+        <p:style>
+          <a:lnRef idx="1">
+            <a:schemeClr val="accent1"/>
+          </a:lnRef>
+          <a:fillRef idx="0">
+            <a:schemeClr val="accent1"/>
+          </a:fillRef>
+          <a:effectRef idx="0">
+            <a:schemeClr val="accent1"/>
+          </a:effectRef>
+          <a:fontRef idx="minor">
+            <a:schemeClr val="tx1"/>
+          </a:fontRef>
+        </p:style>
+      </p:cxnSp>
+      <p:cxnSp>
+        <p:nvCxnSpPr>
+          <p:cNvPr id="78" name="Straight Arrow Connector 77"/>
+          <p:cNvCxnSpPr>
+            <a:endCxn id="92" idx="2"/>
+          </p:cNvCxnSpPr>
+          <p:nvPr/>
+        </p:nvCxnSpPr>
+        <p:spPr>
+          <a:xfrm>
+            <a:off x="8177807" y="4978760"/>
+            <a:ext cx="1709193" cy="0"/>
+          </a:xfrm>
+          <a:prstGeom prst="straightConnector1">
+            <a:avLst/>
+          </a:prstGeom>
+          <a:ln w="19050">
+            <a:solidFill>
+              <a:schemeClr val="accent1"/>
+            </a:solidFill>
+            <a:prstDash val="sysDash"/>
+            <a:headEnd type="arrow" w="med" len="med"/>
+            <a:tailEnd type="none" w="med" len="med"/>
+          </a:ln>
+        </p:spPr>
+        <p:style>
+          <a:lnRef idx="1">
+            <a:schemeClr val="accent1"/>
+          </a:lnRef>
+          <a:fillRef idx="0">
+            <a:schemeClr val="accent1"/>
+          </a:fillRef>
+          <a:effectRef idx="0">
+            <a:schemeClr val="accent1"/>
+          </a:effectRef>
+          <a:fontRef idx="minor">
+            <a:schemeClr val="tx1"/>
+          </a:fontRef>
+        </p:style>
+      </p:cxnSp>
+      <p:sp>
+        <p:nvSpPr>
+          <p:cNvPr id="87" name="Rectangle 62"/>
+          <p:cNvSpPr/>
+          <p:nvPr/>
+        </p:nvSpPr>
+        <p:spPr>
+          <a:xfrm>
+            <a:off x="10988837" y="615902"/>
+            <a:ext cx="1164442" cy="432035"/>
+          </a:xfrm>
+          <a:prstGeom prst="rect">
+            <a:avLst/>
+          </a:prstGeom>
+          <a:solidFill>
+            <a:srgbClr val="0070C0"/>
+          </a:solidFill>
+          <a:ln w="19050">
+            <a:solidFill>
+              <a:srgbClr val="0070C0"/>
+            </a:solidFill>
+          </a:ln>
+          <a:effectLst/>
+        </p:spPr>
+        <p:style>
+          <a:lnRef idx="1">
+            <a:schemeClr val="accent2"/>
+          </a:lnRef>
+          <a:fillRef idx="2">
+            <a:schemeClr val="accent2"/>
+          </a:fillRef>
+          <a:effectRef idx="1">
+            <a:schemeClr val="accent2"/>
+          </a:effectRef>
+          <a:fontRef idx="minor">
+            <a:schemeClr val="dk1"/>
+          </a:fontRef>
+        </p:style>
+        <p:txBody>
+          <a:bodyPr rtlCol="0" anchor="ctr"/>
+          <a:lstStyle/>
+          <a:p>
+            <a:pPr algn="ctr"/>
+            <a:r>
+              <a:rPr lang="en-US" sz="1600" dirty="0">
+                <a:solidFill>
+                  <a:schemeClr val="bg1"/>
+                </a:solidFill>
+              </a:rPr>
+              <a:t>:Argument</a:t>
+            </a:r>
+          </a:p>
+          <a:p>
+            <a:pPr algn="ctr"/>
+            <a:r>
+              <a:rPr lang="en-US" sz="1600" dirty="0">
+                <a:solidFill>
+                  <a:schemeClr val="bg1"/>
+                </a:solidFill>
+              </a:rPr>
+              <a:t>Tokenizer</a:t>
+            </a:r>
+            <a:endParaRPr lang="en-SG" sz="1600" dirty="0">
+              <a:solidFill>
+                <a:schemeClr val="bg1"/>
+              </a:solidFill>
+            </a:endParaRPr>
+          </a:p>
+        </p:txBody>
+      </p:sp>
+      <p:cxnSp>
+        <p:nvCxnSpPr>
+          <p:cNvPr id="91" name="Straight Connector 90"/>
+          <p:cNvCxnSpPr>
+            <a:cxnSpLocks/>
+            <a:stCxn id="87" idx="2"/>
+          </p:cNvCxnSpPr>
+          <p:nvPr/>
+        </p:nvCxnSpPr>
+        <p:spPr>
+          <a:xfrm>
+            <a:off x="11571058" y="1047937"/>
+            <a:ext cx="0" cy="4931607"/>
+          </a:xfrm>
+          <a:prstGeom prst="line">
+            <a:avLst/>
+          </a:prstGeom>
+          <a:ln w="19050">
+            <a:solidFill>
+              <a:srgbClr val="0070C0"/>
+            </a:solidFill>
+            <a:prstDash val="sysDash"/>
+          </a:ln>
+          <a:effectLst/>
+        </p:spPr>
+        <p:style>
+          <a:lnRef idx="1">
+            <a:schemeClr val="accent1"/>
+          </a:lnRef>
+          <a:fillRef idx="2">
+            <a:schemeClr val="accent1"/>
+          </a:fillRef>
+          <a:effectRef idx="1">
+            <a:schemeClr val="accent1"/>
+          </a:effectRef>
+          <a:fontRef idx="minor">
+            <a:schemeClr val="dk1"/>
+          </a:fontRef>
+        </p:style>
+      </p:cxnSp>
+      <p:sp>
+        <p:nvSpPr>
+          <p:cNvPr id="92" name="Rectangle 91"/>
+          <p:cNvSpPr/>
+          <p:nvPr/>
+        </p:nvSpPr>
+        <p:spPr>
+          <a:xfrm>
+            <a:off x="9812933" y="4667806"/>
+            <a:ext cx="148130" cy="310954"/>
+          </a:xfrm>
+          <a:prstGeom prst="rect">
+            <a:avLst/>
+          </a:prstGeom>
+          <a:solidFill>
+            <a:srgbClr val="0070C0"/>
+          </a:solidFill>
+          <a:ln>
+            <a:solidFill>
+              <a:srgbClr val="0070C0"/>
+            </a:solidFill>
+          </a:ln>
+          <a:effectLst/>
+        </p:spPr>
+        <p:style>
+          <a:lnRef idx="1">
+            <a:schemeClr val="accent3"/>
+          </a:lnRef>
+          <a:fillRef idx="2">
+            <a:schemeClr val="accent3"/>
+          </a:fillRef>
+          <a:effectRef idx="1">
+            <a:schemeClr val="accent3"/>
+          </a:effectRef>
+          <a:fontRef idx="minor">
+            <a:schemeClr val="dk1"/>
+          </a:fontRef>
+        </p:style>
+        <p:txBody>
+          <a:bodyPr rtlCol="0" anchor="ctr"/>
+          <a:lstStyle/>
+          <a:p>
+            <a:pPr algn="ctr"/>
+            <a:endParaRPr lang="en-SG" sz="1400"/>
+          </a:p>
+        </p:txBody>
+      </p:sp>
+      <p:cxnSp>
+        <p:nvCxnSpPr>
+          <p:cNvPr id="94" name="Straight Arrow Connector 93"/>
+          <p:cNvCxnSpPr/>
+          <p:nvPr/>
+        </p:nvCxnSpPr>
+        <p:spPr>
+          <a:xfrm>
+            <a:off x="8175712" y="7770020"/>
+            <a:ext cx="1836238" cy="0"/>
+          </a:xfrm>
+          <a:prstGeom prst="straightConnector1">
+            <a:avLst/>
+          </a:prstGeom>
+          <a:ln w="19050">
+            <a:solidFill>
+              <a:schemeClr val="accent1"/>
+            </a:solidFill>
+            <a:prstDash val="sysDash"/>
+            <a:headEnd type="arrow" w="med" len="med"/>
+            <a:tailEnd type="none" w="med" len="med"/>
+          </a:ln>
+        </p:spPr>
+        <p:style>
+          <a:lnRef idx="1">
+            <a:schemeClr val="accent1"/>
+          </a:lnRef>
+          <a:fillRef idx="0">
+            <a:schemeClr val="accent1"/>
+          </a:fillRef>
+          <a:effectRef idx="0">
+            <a:schemeClr val="accent1"/>
+          </a:effectRef>
+          <a:fontRef idx="minor">
+            <a:schemeClr val="tx1"/>
+          </a:fontRef>
+        </p:style>
+      </p:cxnSp>
+      <p:cxnSp>
+        <p:nvCxnSpPr>
+          <p:cNvPr id="96" name="Straight Arrow Connector 95"/>
+          <p:cNvCxnSpPr/>
+          <p:nvPr/>
+        </p:nvCxnSpPr>
+        <p:spPr>
+          <a:xfrm>
+            <a:off x="3177176" y="8507568"/>
+            <a:ext cx="6709823" cy="0"/>
+          </a:xfrm>
+          <a:prstGeom prst="straightConnector1">
+            <a:avLst/>
+          </a:prstGeom>
+          <a:ln w="19050">
+            <a:solidFill>
+              <a:srgbClr val="0070C0"/>
+            </a:solidFill>
+            <a:tailEnd type="arrow"/>
+          </a:ln>
+        </p:spPr>
+        <p:style>
+          <a:lnRef idx="1">
+            <a:schemeClr val="accent1"/>
+          </a:lnRef>
+          <a:fillRef idx="0">
+            <a:schemeClr val="accent1"/>
+          </a:fillRef>
+          <a:effectRef idx="0">
+            <a:schemeClr val="accent1"/>
+          </a:effectRef>
+          <a:fontRef idx="minor">
+            <a:schemeClr val="tx1"/>
+          </a:fontRef>
+        </p:style>
+      </p:cxnSp>
+      <p:sp>
+        <p:nvSpPr>
+          <p:cNvPr id="103" name="Rectangle 102"/>
+          <p:cNvSpPr/>
+          <p:nvPr/>
+        </p:nvSpPr>
+        <p:spPr>
+          <a:xfrm>
+            <a:off x="9841964" y="8473195"/>
+            <a:ext cx="199686" cy="527591"/>
+          </a:xfrm>
+          <a:prstGeom prst="rect">
+            <a:avLst/>
+          </a:prstGeom>
+          <a:solidFill>
+            <a:srgbClr val="0070C0"/>
+          </a:solidFill>
+          <a:ln>
+            <a:solidFill>
+              <a:srgbClr val="0070C0"/>
+            </a:solidFill>
+          </a:ln>
+          <a:effectLst/>
+        </p:spPr>
+        <p:style>
+          <a:lnRef idx="1">
+            <a:schemeClr val="accent3"/>
+          </a:lnRef>
+          <a:fillRef idx="2">
+            <a:schemeClr val="accent3"/>
+          </a:fillRef>
+          <a:effectRef idx="1">
+            <a:schemeClr val="accent3"/>
+          </a:effectRef>
+          <a:fontRef idx="minor">
+            <a:schemeClr val="dk1"/>
+          </a:fontRef>
+        </p:style>
+        <p:txBody>
+          <a:bodyPr rtlCol="0" anchor="ctr"/>
+          <a:lstStyle/>
+          <a:p>
+            <a:pPr algn="ctr"/>
+            <a:endParaRPr lang="en-SG" sz="1400"/>
+          </a:p>
+        </p:txBody>
+      </p:sp>
+      <p:cxnSp>
+        <p:nvCxnSpPr>
+          <p:cNvPr id="121" name="Straight Connector 120"/>
+          <p:cNvCxnSpPr>
+            <a:cxnSpLocks/>
+            <a:stCxn id="59" idx="2"/>
+          </p:cNvCxnSpPr>
+          <p:nvPr/>
+        </p:nvCxnSpPr>
+        <p:spPr>
+          <a:xfrm>
+            <a:off x="9252952" y="3244090"/>
+            <a:ext cx="0" cy="293217"/>
+          </a:xfrm>
+          <a:prstGeom prst="line">
+            <a:avLst/>
+          </a:prstGeom>
+          <a:ln w="19050">
+            <a:solidFill>
+              <a:srgbClr val="0070C0"/>
+            </a:solidFill>
+            <a:prstDash val="sysDash"/>
+          </a:ln>
+          <a:effectLst/>
+        </p:spPr>
+        <p:style>
+          <a:lnRef idx="1">
+            <a:schemeClr val="accent1"/>
+          </a:lnRef>
+          <a:fillRef idx="2">
+            <a:schemeClr val="accent1"/>
+          </a:fillRef>
+          <a:effectRef idx="1">
+            <a:schemeClr val="accent1"/>
+          </a:effectRef>
+          <a:fontRef idx="minor">
+            <a:schemeClr val="dk1"/>
+          </a:fontRef>
+        </p:style>
+      </p:cxnSp>
+      <p:sp>
+        <p:nvSpPr>
+          <p:cNvPr id="125" name="TextBox 124"/>
           <p:cNvSpPr txBox="1"/>
           <p:nvPr/>
         </p:nvSpPr>
         <p:spPr>
           <a:xfrm>
-            <a:off x="5364807" y="8033543"/>
-            <a:ext cx="220343" cy="215444"/>
+            <a:off x="8331555" y="3537305"/>
+            <a:ext cx="855809" cy="215444"/>
           </a:xfrm>
           <a:prstGeom prst="rect">
             <a:avLst/>
@@ -4408,1270 +5566,25 @@
           </a:lstStyle>
           <a:p>
             <a:r>
+              <a:rPr lang="en-US" dirty="0" err="1"/>
+              <a:t>isFileExist</a:t>
+            </a:r>
+            <a:r>
               <a:rPr lang="en-US" dirty="0"/>
-              <a:t>m</a:t>
-            </a:r>
-          </a:p>
-        </p:txBody>
-      </p:sp>
-      <p:sp>
-        <p:nvSpPr>
-          <p:cNvPr id="19" name="Rectangle 62"/>
-          <p:cNvSpPr/>
-          <p:nvPr/>
-        </p:nvSpPr>
-        <p:spPr>
-          <a:xfrm>
-            <a:off x="12393612" y="3308350"/>
-            <a:ext cx="1216203" cy="790994"/>
-          </a:xfrm>
-          <a:prstGeom prst="rect">
-            <a:avLst/>
-          </a:prstGeom>
-          <a:solidFill>
-            <a:srgbClr val="0070C0"/>
-          </a:solidFill>
-          <a:ln w="19050">
-            <a:solidFill>
-              <a:srgbClr val="0070C0"/>
-            </a:solidFill>
-          </a:ln>
-          <a:effectLst/>
-        </p:spPr>
-        <p:style>
-          <a:lnRef idx="1">
-            <a:schemeClr val="accent2"/>
-          </a:lnRef>
-          <a:fillRef idx="2">
-            <a:schemeClr val="accent2"/>
-          </a:fillRef>
-          <a:effectRef idx="1">
-            <a:schemeClr val="accent2"/>
-          </a:effectRef>
-          <a:fontRef idx="minor">
-            <a:schemeClr val="dk1"/>
-          </a:fontRef>
-        </p:style>
-        <p:txBody>
-          <a:bodyPr rtlCol="0" anchor="ctr"/>
-          <a:lstStyle/>
-          <a:p>
-            <a:pPr algn="ctr"/>
-            <a:r>
-              <a:rPr lang="en-US" sz="1600" dirty="0">
-                <a:solidFill>
-                  <a:schemeClr val="bg1"/>
-                </a:solidFill>
-              </a:rPr>
-              <a:t>m:</a:t>
-            </a:r>
-          </a:p>
-          <a:p>
-            <a:pPr algn="ctr"/>
-            <a:r>
-              <a:rPr lang="en-US" sz="1600" dirty="0" err="1">
-                <a:solidFill>
-                  <a:schemeClr val="bg1"/>
-                </a:solidFill>
-              </a:rPr>
-              <a:t>AddMultiple</a:t>
-            </a:r>
-            <a:r>
-              <a:rPr lang="en-US" sz="1600" dirty="0">
-                <a:solidFill>
-                  <a:schemeClr val="bg1"/>
-                </a:solidFill>
-              </a:rPr>
-              <a:t/>
-            </a:r>
-            <a:br>
-              <a:rPr lang="en-US" sz="1600" dirty="0">
-                <a:solidFill>
-                  <a:schemeClr val="bg1"/>
-                </a:solidFill>
-              </a:rPr>
-            </a:br>
-            <a:r>
-              <a:rPr lang="en-US" sz="1600" dirty="0">
-                <a:solidFill>
-                  <a:schemeClr val="bg1"/>
-                </a:solidFill>
-              </a:rPr>
-              <a:t>Command</a:t>
-            </a:r>
-            <a:endParaRPr lang="en-SG" sz="1600" dirty="0">
-              <a:solidFill>
-                <a:schemeClr val="bg1"/>
-              </a:solidFill>
-            </a:endParaRPr>
-          </a:p>
-        </p:txBody>
-      </p:sp>
-      <p:cxnSp>
-        <p:nvCxnSpPr>
-          <p:cNvPr id="67" name="Straight Arrow Connector 66">
-            <a:extLst>
-              <a:ext uri="{FF2B5EF4-FFF2-40B4-BE49-F238E27FC236}">
-                <a16:creationId xmlns="" xmlns:a16="http://schemas.microsoft.com/office/drawing/2014/main" id="{D881596E-177C-4FDC-8E60-CAB90B3D5FAB}"/>
-              </a:ext>
-            </a:extLst>
-          </p:cNvPr>
-          <p:cNvCxnSpPr>
-            <a:cxnSpLocks/>
-          </p:cNvCxnSpPr>
-          <p:nvPr/>
-        </p:nvCxnSpPr>
-        <p:spPr>
-          <a:xfrm>
-            <a:off x="4348260" y="3757871"/>
-            <a:ext cx="2256705" cy="1"/>
-          </a:xfrm>
-          <a:prstGeom prst="straightConnector1">
-            <a:avLst/>
-          </a:prstGeom>
-          <a:ln w="19050">
-            <a:solidFill>
-              <a:srgbClr val="0070C0"/>
-            </a:solidFill>
-            <a:tailEnd type="arrow"/>
-          </a:ln>
-        </p:spPr>
-        <p:style>
-          <a:lnRef idx="1">
-            <a:schemeClr val="accent1"/>
-          </a:lnRef>
-          <a:fillRef idx="0">
-            <a:schemeClr val="accent1"/>
-          </a:fillRef>
-          <a:effectRef idx="0">
-            <a:schemeClr val="accent1"/>
-          </a:effectRef>
-          <a:fontRef idx="minor">
-            <a:schemeClr val="tx1"/>
-          </a:fontRef>
-        </p:style>
-      </p:cxnSp>
-      <p:cxnSp>
-        <p:nvCxnSpPr>
-          <p:cNvPr id="69" name="Straight Arrow Connector 68">
-            <a:extLst>
-              <a:ext uri="{FF2B5EF4-FFF2-40B4-BE49-F238E27FC236}">
-                <a16:creationId xmlns="" xmlns:a16="http://schemas.microsoft.com/office/drawing/2014/main" id="{7C9F21BC-13A9-471F-825A-2621FD36355F}"/>
-              </a:ext>
-            </a:extLst>
-          </p:cNvPr>
-          <p:cNvCxnSpPr>
-            <a:cxnSpLocks/>
-            <a:stCxn id="103" idx="0"/>
-            <a:endCxn id="95" idx="2"/>
-          </p:cNvCxnSpPr>
-          <p:nvPr/>
-        </p:nvCxnSpPr>
-        <p:spPr>
-          <a:xfrm>
-            <a:off x="4237939" y="9632950"/>
-            <a:ext cx="8765287" cy="0"/>
-          </a:xfrm>
-          <a:prstGeom prst="straightConnector1">
-            <a:avLst/>
-          </a:prstGeom>
-          <a:ln w="19050">
-            <a:solidFill>
-              <a:srgbClr val="0070C0"/>
-            </a:solidFill>
-            <a:prstDash val="sysDash"/>
-            <a:headEnd type="arrow" w="med" len="med"/>
-            <a:tailEnd type="none" w="med" len="med"/>
-          </a:ln>
-        </p:spPr>
-        <p:style>
-          <a:lnRef idx="1">
-            <a:schemeClr val="accent1"/>
-          </a:lnRef>
-          <a:fillRef idx="0">
-            <a:schemeClr val="accent1"/>
-          </a:fillRef>
-          <a:effectRef idx="0">
-            <a:schemeClr val="accent1"/>
-          </a:effectRef>
-          <a:fontRef idx="minor">
-            <a:schemeClr val="tx1"/>
-          </a:fontRef>
-        </p:style>
-      </p:cxnSp>
-      <p:cxnSp>
-        <p:nvCxnSpPr>
-          <p:cNvPr id="41" name="Straight Arrow Connector 40"/>
-          <p:cNvCxnSpPr/>
-          <p:nvPr/>
-        </p:nvCxnSpPr>
-        <p:spPr>
-          <a:xfrm>
-            <a:off x="6770990" y="4679954"/>
-            <a:ext cx="766622" cy="14165"/>
-          </a:xfrm>
-          <a:prstGeom prst="straightConnector1">
-            <a:avLst/>
-          </a:prstGeom>
-          <a:ln w="19050">
-            <a:solidFill>
-              <a:srgbClr val="0070C0"/>
-            </a:solidFill>
-            <a:tailEnd type="arrow"/>
-          </a:ln>
-        </p:spPr>
-        <p:style>
-          <a:lnRef idx="1">
-            <a:schemeClr val="accent1"/>
-          </a:lnRef>
-          <a:fillRef idx="0">
-            <a:schemeClr val="accent1"/>
-          </a:fillRef>
-          <a:effectRef idx="0">
-            <a:schemeClr val="accent1"/>
-          </a:effectRef>
-          <a:fontRef idx="minor">
-            <a:schemeClr val="tx1"/>
-          </a:fontRef>
-        </p:style>
-      </p:cxnSp>
-      <p:sp>
-        <p:nvSpPr>
-          <p:cNvPr id="48" name="Rectangle 62"/>
-          <p:cNvSpPr/>
-          <p:nvPr/>
-        </p:nvSpPr>
-        <p:spPr>
-          <a:xfrm>
-            <a:off x="7537612" y="4453191"/>
-            <a:ext cx="1274600" cy="467684"/>
-          </a:xfrm>
-          <a:prstGeom prst="rect">
-            <a:avLst/>
-          </a:prstGeom>
-          <a:solidFill>
-            <a:srgbClr val="0070C0"/>
-          </a:solidFill>
-          <a:ln w="19050">
-            <a:solidFill>
-              <a:srgbClr val="0070C0"/>
-            </a:solidFill>
-          </a:ln>
-          <a:effectLst/>
-        </p:spPr>
-        <p:style>
-          <a:lnRef idx="1">
-            <a:schemeClr val="accent2"/>
-          </a:lnRef>
-          <a:fillRef idx="2">
-            <a:schemeClr val="accent2"/>
-          </a:fillRef>
-          <a:effectRef idx="1">
-            <a:schemeClr val="accent2"/>
-          </a:effectRef>
-          <a:fontRef idx="minor">
-            <a:schemeClr val="dk1"/>
-          </a:fontRef>
-        </p:style>
-        <p:txBody>
-          <a:bodyPr rtlCol="0" anchor="ctr"/>
-          <a:lstStyle/>
-          <a:p>
-            <a:pPr algn="ctr"/>
-            <a:r>
-              <a:rPr lang="en-US" sz="1200" dirty="0">
-                <a:solidFill>
-                  <a:schemeClr val="bg1"/>
-                </a:solidFill>
-              </a:rPr>
-              <a:t>:</a:t>
-            </a:r>
-            <a:r>
-              <a:rPr lang="en-US" sz="1200" dirty="0" err="1">
-                <a:solidFill>
-                  <a:schemeClr val="bg1"/>
-                </a:solidFill>
-              </a:rPr>
-              <a:t>AddMultiple</a:t>
-            </a:r>
-            <a:endParaRPr lang="en-US" sz="1200" dirty="0">
-              <a:solidFill>
-                <a:schemeClr val="bg1"/>
-              </a:solidFill>
-            </a:endParaRPr>
-          </a:p>
-          <a:p>
-            <a:pPr algn="ctr"/>
-            <a:r>
-              <a:rPr lang="en-US" sz="1200" dirty="0" err="1">
-                <a:solidFill>
-                  <a:schemeClr val="bg1"/>
-                </a:solidFill>
-              </a:rPr>
-              <a:t>CommandParser</a:t>
-            </a:r>
-            <a:endParaRPr lang="en-US" sz="1200" dirty="0">
-              <a:solidFill>
-                <a:schemeClr val="bg1"/>
-              </a:solidFill>
-            </a:endParaRPr>
-          </a:p>
-        </p:txBody>
-      </p:sp>
-      <p:sp>
-        <p:nvSpPr>
-          <p:cNvPr id="52" name="Rectangle 51"/>
-          <p:cNvSpPr/>
-          <p:nvPr/>
-        </p:nvSpPr>
-        <p:spPr>
-          <a:xfrm>
-            <a:off x="8078446" y="4903204"/>
-            <a:ext cx="152400" cy="3187672"/>
-          </a:xfrm>
-          <a:prstGeom prst="rect">
-            <a:avLst/>
-          </a:prstGeom>
-          <a:solidFill>
-            <a:srgbClr val="0070C0"/>
-          </a:solidFill>
-          <a:ln>
-            <a:solidFill>
-              <a:srgbClr val="0070C0"/>
-            </a:solidFill>
-          </a:ln>
-          <a:effectLst/>
-        </p:spPr>
-        <p:style>
-          <a:lnRef idx="1">
-            <a:schemeClr val="accent3"/>
-          </a:lnRef>
-          <a:fillRef idx="2">
-            <a:schemeClr val="accent3"/>
-          </a:fillRef>
-          <a:effectRef idx="1">
-            <a:schemeClr val="accent3"/>
-          </a:effectRef>
-          <a:fontRef idx="minor">
-            <a:schemeClr val="dk1"/>
-          </a:fontRef>
-        </p:style>
-        <p:txBody>
-          <a:bodyPr rtlCol="0" anchor="ctr"/>
-          <a:lstStyle/>
-          <a:p>
-            <a:pPr algn="ctr"/>
-            <a:endParaRPr lang="en-SG" sz="1400"/>
-          </a:p>
-        </p:txBody>
-      </p:sp>
-      <p:cxnSp>
-        <p:nvCxnSpPr>
-          <p:cNvPr id="56" name="Straight Arrow Connector 55"/>
-          <p:cNvCxnSpPr/>
-          <p:nvPr/>
-        </p:nvCxnSpPr>
-        <p:spPr>
-          <a:xfrm flipV="1">
-            <a:off x="8256211" y="5227836"/>
-            <a:ext cx="754449" cy="4561"/>
-          </a:xfrm>
-          <a:prstGeom prst="straightConnector1">
-            <a:avLst/>
-          </a:prstGeom>
-          <a:ln w="19050">
-            <a:solidFill>
-              <a:srgbClr val="0070C0"/>
-            </a:solidFill>
-            <a:tailEnd type="arrow"/>
-          </a:ln>
-        </p:spPr>
-        <p:style>
-          <a:lnRef idx="1">
-            <a:schemeClr val="accent1"/>
-          </a:lnRef>
-          <a:fillRef idx="0">
-            <a:schemeClr val="accent1"/>
-          </a:fillRef>
-          <a:effectRef idx="0">
-            <a:schemeClr val="accent1"/>
-          </a:effectRef>
-          <a:fontRef idx="minor">
-            <a:schemeClr val="tx1"/>
-          </a:fontRef>
-        </p:style>
-      </p:cxnSp>
-      <p:sp>
-        <p:nvSpPr>
-          <p:cNvPr id="57" name="Rectangle 62"/>
-          <p:cNvSpPr/>
-          <p:nvPr/>
-        </p:nvSpPr>
-        <p:spPr>
-          <a:xfrm>
-            <a:off x="9010660" y="5004735"/>
-            <a:ext cx="692761" cy="432035"/>
-          </a:xfrm>
-          <a:prstGeom prst="rect">
-            <a:avLst/>
-          </a:prstGeom>
-          <a:solidFill>
-            <a:srgbClr val="0070C0"/>
-          </a:solidFill>
-          <a:ln w="19050">
-            <a:solidFill>
-              <a:srgbClr val="0070C0"/>
-            </a:solidFill>
-          </a:ln>
-          <a:effectLst/>
-        </p:spPr>
-        <p:style>
-          <a:lnRef idx="1">
-            <a:schemeClr val="accent2"/>
-          </a:lnRef>
-          <a:fillRef idx="2">
-            <a:schemeClr val="accent2"/>
-          </a:fillRef>
-          <a:effectRef idx="1">
-            <a:schemeClr val="accent2"/>
-          </a:effectRef>
-          <a:fontRef idx="minor">
-            <a:schemeClr val="dk1"/>
-          </a:fontRef>
-        </p:style>
-        <p:txBody>
-          <a:bodyPr rtlCol="0" anchor="ctr"/>
-          <a:lstStyle/>
-          <a:p>
-            <a:pPr algn="ctr"/>
-            <a:r>
-              <a:rPr lang="en-US" sz="1600">
-                <a:solidFill>
-                  <a:schemeClr val="bg1"/>
-                </a:solidFill>
-              </a:rPr>
-              <a:t>:File</a:t>
-            </a:r>
-            <a:endParaRPr lang="en-SG" sz="1600" dirty="0">
-              <a:solidFill>
-                <a:schemeClr val="bg1"/>
-              </a:solidFill>
-            </a:endParaRPr>
-          </a:p>
-        </p:txBody>
-      </p:sp>
-      <p:sp>
-        <p:nvSpPr>
-          <p:cNvPr id="59" name="Rectangle 58"/>
-          <p:cNvSpPr/>
-          <p:nvPr/>
-        </p:nvSpPr>
-        <p:spPr>
-          <a:xfrm>
-            <a:off x="9278162" y="5348327"/>
-            <a:ext cx="152400" cy="276003"/>
-          </a:xfrm>
-          <a:prstGeom prst="rect">
-            <a:avLst/>
-          </a:prstGeom>
-          <a:solidFill>
-            <a:srgbClr val="0070C0"/>
-          </a:solidFill>
-          <a:ln>
-            <a:solidFill>
-              <a:srgbClr val="0070C0"/>
-            </a:solidFill>
-          </a:ln>
-          <a:effectLst/>
-        </p:spPr>
-        <p:style>
-          <a:lnRef idx="1">
-            <a:schemeClr val="accent3"/>
-          </a:lnRef>
-          <a:fillRef idx="2">
-            <a:schemeClr val="accent3"/>
-          </a:fillRef>
-          <a:effectRef idx="1">
-            <a:schemeClr val="accent3"/>
-          </a:effectRef>
-          <a:fontRef idx="minor">
-            <a:schemeClr val="dk1"/>
-          </a:fontRef>
-        </p:style>
-        <p:txBody>
-          <a:bodyPr rtlCol="0" anchor="ctr"/>
-          <a:lstStyle/>
-          <a:p>
-            <a:pPr algn="ctr"/>
-            <a:endParaRPr lang="en-SG" sz="1400"/>
-          </a:p>
-        </p:txBody>
-      </p:sp>
-      <p:cxnSp>
-        <p:nvCxnSpPr>
-          <p:cNvPr id="60" name="Straight Arrow Connector 59"/>
-          <p:cNvCxnSpPr/>
-          <p:nvPr/>
-        </p:nvCxnSpPr>
-        <p:spPr>
-          <a:xfrm>
-            <a:off x="8230849" y="5624327"/>
-            <a:ext cx="1196051" cy="0"/>
-          </a:xfrm>
-          <a:prstGeom prst="straightConnector1">
-            <a:avLst/>
-          </a:prstGeom>
-          <a:ln w="19050">
-            <a:solidFill>
-              <a:schemeClr val="accent1"/>
-            </a:solidFill>
-            <a:prstDash val="sysDash"/>
-            <a:headEnd type="arrow" w="med" len="med"/>
-            <a:tailEnd type="none" w="med" len="med"/>
-          </a:ln>
-        </p:spPr>
-        <p:style>
-          <a:lnRef idx="1">
-            <a:schemeClr val="accent1"/>
-          </a:lnRef>
-          <a:fillRef idx="0">
-            <a:schemeClr val="accent1"/>
-          </a:fillRef>
-          <a:effectRef idx="0">
-            <a:schemeClr val="accent1"/>
-          </a:effectRef>
-          <a:fontRef idx="minor">
-            <a:schemeClr val="tx1"/>
-          </a:fontRef>
-        </p:style>
-      </p:cxnSp>
-      <p:cxnSp>
-        <p:nvCxnSpPr>
-          <p:cNvPr id="61" name="Straight Arrow Connector 60"/>
-          <p:cNvCxnSpPr>
-            <a:cxnSpLocks/>
-          </p:cNvCxnSpPr>
-          <p:nvPr/>
-        </p:nvCxnSpPr>
-        <p:spPr>
-          <a:xfrm flipV="1">
-            <a:off x="8226583" y="6429076"/>
-            <a:ext cx="1679595" cy="3474"/>
-          </a:xfrm>
-          <a:prstGeom prst="straightConnector1">
-            <a:avLst/>
-          </a:prstGeom>
-          <a:ln w="19050">
-            <a:solidFill>
-              <a:srgbClr val="0070C0"/>
-            </a:solidFill>
-            <a:tailEnd type="arrow"/>
-          </a:ln>
-        </p:spPr>
-        <p:style>
-          <a:lnRef idx="1">
-            <a:schemeClr val="accent1"/>
-          </a:lnRef>
-          <a:fillRef idx="0">
-            <a:schemeClr val="accent1"/>
-          </a:fillRef>
-          <a:effectRef idx="0">
-            <a:schemeClr val="accent1"/>
-          </a:effectRef>
-          <a:fontRef idx="minor">
-            <a:schemeClr val="tx1"/>
-          </a:fontRef>
-        </p:style>
-      </p:cxnSp>
-      <p:sp>
-        <p:nvSpPr>
-          <p:cNvPr id="68" name="Rectangle 62"/>
-          <p:cNvSpPr/>
-          <p:nvPr/>
-        </p:nvSpPr>
-        <p:spPr>
-          <a:xfrm>
-            <a:off x="9574212" y="2774953"/>
-            <a:ext cx="874616" cy="432035"/>
-          </a:xfrm>
-          <a:prstGeom prst="rect">
-            <a:avLst/>
-          </a:prstGeom>
-          <a:solidFill>
-            <a:srgbClr val="0070C0"/>
-          </a:solidFill>
-          <a:ln w="19050">
-            <a:solidFill>
-              <a:srgbClr val="0070C0"/>
-            </a:solidFill>
-          </a:ln>
-          <a:effectLst/>
-        </p:spPr>
-        <p:style>
-          <a:lnRef idx="1">
-            <a:schemeClr val="accent2"/>
-          </a:lnRef>
-          <a:fillRef idx="2">
-            <a:schemeClr val="accent2"/>
-          </a:fillRef>
-          <a:effectRef idx="1">
-            <a:schemeClr val="accent2"/>
-          </a:effectRef>
-          <a:fontRef idx="minor">
-            <a:schemeClr val="dk1"/>
-          </a:fontRef>
-        </p:style>
-        <p:txBody>
-          <a:bodyPr rtlCol="0" anchor="ctr"/>
-          <a:lstStyle/>
-          <a:p>
-            <a:pPr algn="ctr"/>
-            <a:r>
-              <a:rPr lang="en-US" sz="1600">
-                <a:solidFill>
-                  <a:schemeClr val="bg1"/>
-                </a:solidFill>
-              </a:rPr>
-              <a:t>:</a:t>
-            </a:r>
-            <a:r>
-              <a:rPr lang="en-US" sz="1600" dirty="0" err="1">
-                <a:solidFill>
-                  <a:schemeClr val="bg1"/>
-                </a:solidFill>
-              </a:rPr>
-              <a:t>FileUtil</a:t>
-            </a:r>
-            <a:endParaRPr lang="en-SG" sz="1600" dirty="0">
-              <a:solidFill>
-                <a:schemeClr val="bg1"/>
-              </a:solidFill>
-            </a:endParaRPr>
-          </a:p>
-        </p:txBody>
-      </p:sp>
-      <p:cxnSp>
-        <p:nvCxnSpPr>
-          <p:cNvPr id="70" name="Straight Connector 69"/>
-          <p:cNvCxnSpPr>
-            <a:cxnSpLocks/>
-            <a:stCxn id="68" idx="2"/>
-          </p:cNvCxnSpPr>
-          <p:nvPr/>
-        </p:nvCxnSpPr>
-        <p:spPr>
-          <a:xfrm flipH="1">
-            <a:off x="9982638" y="3206988"/>
-            <a:ext cx="28882" cy="4216165"/>
-          </a:xfrm>
-          <a:prstGeom prst="line">
-            <a:avLst/>
-          </a:prstGeom>
-          <a:ln w="19050">
-            <a:solidFill>
-              <a:srgbClr val="0070C0"/>
-            </a:solidFill>
-            <a:prstDash val="sysDash"/>
-          </a:ln>
-          <a:effectLst/>
-        </p:spPr>
-        <p:style>
-          <a:lnRef idx="1">
-            <a:schemeClr val="accent1"/>
-          </a:lnRef>
-          <a:fillRef idx="2">
-            <a:schemeClr val="accent1"/>
-          </a:fillRef>
-          <a:effectRef idx="1">
-            <a:schemeClr val="accent1"/>
-          </a:effectRef>
-          <a:fontRef idx="minor">
-            <a:schemeClr val="dk1"/>
-          </a:fontRef>
-        </p:style>
-      </p:cxnSp>
-      <p:sp>
-        <p:nvSpPr>
-          <p:cNvPr id="71" name="Rectangle 70"/>
-          <p:cNvSpPr/>
-          <p:nvPr/>
-        </p:nvSpPr>
-        <p:spPr>
-          <a:xfrm>
-            <a:off x="9910967" y="6423792"/>
-            <a:ext cx="143342" cy="527591"/>
-          </a:xfrm>
-          <a:prstGeom prst="rect">
-            <a:avLst/>
-          </a:prstGeom>
-          <a:solidFill>
-            <a:srgbClr val="0070C0"/>
-          </a:solidFill>
-          <a:ln>
-            <a:solidFill>
-              <a:srgbClr val="0070C0"/>
-            </a:solidFill>
-          </a:ln>
-          <a:effectLst/>
-        </p:spPr>
-        <p:style>
-          <a:lnRef idx="1">
-            <a:schemeClr val="accent3"/>
-          </a:lnRef>
-          <a:fillRef idx="2">
-            <a:schemeClr val="accent3"/>
-          </a:fillRef>
-          <a:effectRef idx="1">
-            <a:schemeClr val="accent3"/>
-          </a:effectRef>
-          <a:fontRef idx="minor">
-            <a:schemeClr val="dk1"/>
-          </a:fontRef>
-        </p:style>
-        <p:txBody>
-          <a:bodyPr rtlCol="0" anchor="ctr"/>
-          <a:lstStyle/>
-          <a:p>
-            <a:pPr algn="ctr"/>
-            <a:endParaRPr lang="en-SG" sz="1400"/>
-          </a:p>
-        </p:txBody>
-      </p:sp>
-      <p:cxnSp>
-        <p:nvCxnSpPr>
-          <p:cNvPr id="73" name="Straight Arrow Connector 72"/>
-          <p:cNvCxnSpPr>
-            <a:endCxn id="71" idx="2"/>
-          </p:cNvCxnSpPr>
-          <p:nvPr/>
-        </p:nvCxnSpPr>
-        <p:spPr>
-          <a:xfrm>
-            <a:off x="8244038" y="6941844"/>
-            <a:ext cx="1738603" cy="9539"/>
-          </a:xfrm>
-          <a:prstGeom prst="straightConnector1">
-            <a:avLst/>
-          </a:prstGeom>
-          <a:ln w="19050">
-            <a:solidFill>
-              <a:schemeClr val="accent1"/>
-            </a:solidFill>
-            <a:prstDash val="sysDash"/>
-            <a:headEnd type="arrow" w="med" len="med"/>
-            <a:tailEnd type="none" w="med" len="med"/>
-          </a:ln>
-        </p:spPr>
-        <p:style>
-          <a:lnRef idx="1">
-            <a:schemeClr val="accent1"/>
-          </a:lnRef>
-          <a:fillRef idx="0">
-            <a:schemeClr val="accent1"/>
-          </a:fillRef>
-          <a:effectRef idx="0">
-            <a:schemeClr val="accent1"/>
-          </a:effectRef>
-          <a:fontRef idx="minor">
-            <a:schemeClr val="tx1"/>
-          </a:fontRef>
-        </p:style>
-      </p:cxnSp>
-      <p:sp>
-        <p:nvSpPr>
-          <p:cNvPr id="36" name="Rectangle 35"/>
-          <p:cNvSpPr/>
-          <p:nvPr/>
-        </p:nvSpPr>
-        <p:spPr>
-          <a:xfrm>
-            <a:off x="6939574" y="7075746"/>
-            <a:ext cx="2487324" cy="865006"/>
-          </a:xfrm>
-          <a:prstGeom prst="rect">
-            <a:avLst/>
-          </a:prstGeom>
-          <a:noFill/>
-        </p:spPr>
-        <p:style>
-          <a:lnRef idx="2">
-            <a:schemeClr val="accent1">
-              <a:shade val="50000"/>
-            </a:schemeClr>
-          </a:lnRef>
-          <a:fillRef idx="1">
-            <a:schemeClr val="accent1"/>
-          </a:fillRef>
-          <a:effectRef idx="0">
-            <a:schemeClr val="accent1"/>
-          </a:effectRef>
-          <a:fontRef idx="minor">
-            <a:schemeClr val="lt1"/>
-          </a:fontRef>
-        </p:style>
-        <p:txBody>
-          <a:bodyPr rot="0" spcFirstLastPara="0" vertOverflow="overflow" horzOverflow="overflow" vert="horz" wrap="square" lIns="91440" tIns="45720" rIns="91440" bIns="45720" numCol="1" spcCol="0" rtlCol="0" fromWordArt="0" anchor="ctr" anchorCtr="0" forceAA="0" compatLnSpc="1">
-            <a:prstTxWarp prst="textNoShape">
-              <a:avLst/>
-            </a:prstTxWarp>
-            <a:noAutofit/>
-          </a:bodyPr>
-          <a:lstStyle/>
-          <a:p>
-            <a:pPr algn="ctr"/>
-            <a:endParaRPr lang="en-US"/>
-          </a:p>
-        </p:txBody>
-      </p:sp>
-      <p:cxnSp>
-        <p:nvCxnSpPr>
-          <p:cNvPr id="76" name="Straight Arrow Connector 75"/>
-          <p:cNvCxnSpPr>
-            <a:cxnSpLocks/>
-          </p:cNvCxnSpPr>
-          <p:nvPr/>
-        </p:nvCxnSpPr>
-        <p:spPr>
-          <a:xfrm>
-            <a:off x="8226583" y="7492392"/>
-            <a:ext cx="2799961" cy="6307"/>
-          </a:xfrm>
-          <a:prstGeom prst="straightConnector1">
-            <a:avLst/>
-          </a:prstGeom>
-          <a:ln w="19050">
-            <a:solidFill>
-              <a:srgbClr val="0070C0"/>
-            </a:solidFill>
-            <a:tailEnd type="arrow"/>
-          </a:ln>
-        </p:spPr>
-        <p:style>
-          <a:lnRef idx="1">
-            <a:schemeClr val="accent1"/>
-          </a:lnRef>
-          <a:fillRef idx="0">
-            <a:schemeClr val="accent1"/>
-          </a:fillRef>
-          <a:effectRef idx="0">
-            <a:schemeClr val="accent1"/>
-          </a:effectRef>
-          <a:fontRef idx="minor">
-            <a:schemeClr val="tx1"/>
-          </a:fontRef>
-        </p:style>
-      </p:cxnSp>
-      <p:cxnSp>
-        <p:nvCxnSpPr>
-          <p:cNvPr id="78" name="Straight Arrow Connector 77"/>
-          <p:cNvCxnSpPr>
-            <a:endCxn id="92" idx="2"/>
-          </p:cNvCxnSpPr>
-          <p:nvPr/>
-        </p:nvCxnSpPr>
-        <p:spPr>
-          <a:xfrm>
-            <a:off x="8199282" y="7734673"/>
-            <a:ext cx="2898933" cy="17919"/>
-          </a:xfrm>
-          <a:prstGeom prst="straightConnector1">
-            <a:avLst/>
-          </a:prstGeom>
-          <a:ln w="19050">
-            <a:solidFill>
-              <a:schemeClr val="accent1"/>
-            </a:solidFill>
-            <a:prstDash val="sysDash"/>
-            <a:headEnd type="arrow" w="med" len="med"/>
-            <a:tailEnd type="none" w="med" len="med"/>
-          </a:ln>
-        </p:spPr>
-        <p:style>
-          <a:lnRef idx="1">
-            <a:schemeClr val="accent1"/>
-          </a:lnRef>
-          <a:fillRef idx="0">
-            <a:schemeClr val="accent1"/>
-          </a:fillRef>
-          <a:effectRef idx="0">
-            <a:schemeClr val="accent1"/>
-          </a:effectRef>
-          <a:fontRef idx="minor">
-            <a:schemeClr val="tx1"/>
-          </a:fontRef>
-        </p:style>
-      </p:cxnSp>
-      <p:sp>
-        <p:nvSpPr>
-          <p:cNvPr id="87" name="Rectangle 62"/>
-          <p:cNvSpPr/>
-          <p:nvPr/>
-        </p:nvSpPr>
-        <p:spPr>
-          <a:xfrm>
-            <a:off x="10528396" y="2774953"/>
-            <a:ext cx="1164442" cy="432035"/>
-          </a:xfrm>
-          <a:prstGeom prst="rect">
-            <a:avLst/>
-          </a:prstGeom>
-          <a:solidFill>
-            <a:srgbClr val="0070C0"/>
-          </a:solidFill>
-          <a:ln w="19050">
-            <a:solidFill>
-              <a:srgbClr val="0070C0"/>
-            </a:solidFill>
-          </a:ln>
-          <a:effectLst/>
-        </p:spPr>
-        <p:style>
-          <a:lnRef idx="1">
-            <a:schemeClr val="accent2"/>
-          </a:lnRef>
-          <a:fillRef idx="2">
-            <a:schemeClr val="accent2"/>
-          </a:fillRef>
-          <a:effectRef idx="1">
-            <a:schemeClr val="accent2"/>
-          </a:effectRef>
-          <a:fontRef idx="minor">
-            <a:schemeClr val="dk1"/>
-          </a:fontRef>
-        </p:style>
-        <p:txBody>
-          <a:bodyPr rtlCol="0" anchor="ctr"/>
-          <a:lstStyle/>
-          <a:p>
-            <a:pPr algn="ctr"/>
-            <a:r>
-              <a:rPr lang="en-US" sz="1600" dirty="0">
-                <a:solidFill>
-                  <a:schemeClr val="bg1"/>
-                </a:solidFill>
-              </a:rPr>
-              <a:t>:</a:t>
-            </a:r>
-            <a:r>
-              <a:rPr lang="en-US" sz="1600" dirty="0" err="1">
-                <a:solidFill>
-                  <a:schemeClr val="bg1"/>
-                </a:solidFill>
-              </a:rPr>
-              <a:t>ArgumentMultiMap</a:t>
-            </a:r>
-            <a:endParaRPr lang="en-SG" sz="1600" dirty="0">
-              <a:solidFill>
-                <a:schemeClr val="bg1"/>
-              </a:solidFill>
-            </a:endParaRPr>
-          </a:p>
-        </p:txBody>
-      </p:sp>
-      <p:cxnSp>
-        <p:nvCxnSpPr>
-          <p:cNvPr id="91" name="Straight Connector 90"/>
-          <p:cNvCxnSpPr>
-            <a:cxnSpLocks/>
-            <a:stCxn id="87" idx="2"/>
-          </p:cNvCxnSpPr>
-          <p:nvPr/>
-        </p:nvCxnSpPr>
-        <p:spPr>
-          <a:xfrm flipH="1">
-            <a:off x="11098215" y="3206988"/>
-            <a:ext cx="12405" cy="4216165"/>
-          </a:xfrm>
-          <a:prstGeom prst="line">
-            <a:avLst/>
-          </a:prstGeom>
-          <a:ln w="19050">
-            <a:solidFill>
-              <a:srgbClr val="0070C0"/>
-            </a:solidFill>
-            <a:prstDash val="sysDash"/>
-          </a:ln>
-          <a:effectLst/>
-        </p:spPr>
-        <p:style>
-          <a:lnRef idx="1">
-            <a:schemeClr val="accent1"/>
-          </a:lnRef>
-          <a:fillRef idx="2">
-            <a:schemeClr val="accent1"/>
-          </a:fillRef>
-          <a:effectRef idx="1">
-            <a:schemeClr val="accent1"/>
-          </a:effectRef>
-          <a:fontRef idx="minor">
-            <a:schemeClr val="dk1"/>
-          </a:fontRef>
-        </p:style>
-      </p:cxnSp>
-      <p:sp>
-        <p:nvSpPr>
-          <p:cNvPr id="92" name="Rectangle 91"/>
-          <p:cNvSpPr/>
-          <p:nvPr/>
-        </p:nvSpPr>
-        <p:spPr>
-          <a:xfrm>
-            <a:off x="11026541" y="7423151"/>
-            <a:ext cx="143342" cy="329438"/>
-          </a:xfrm>
-          <a:prstGeom prst="rect">
-            <a:avLst/>
-          </a:prstGeom>
-          <a:solidFill>
-            <a:srgbClr val="0070C0"/>
-          </a:solidFill>
-          <a:ln>
-            <a:solidFill>
-              <a:srgbClr val="0070C0"/>
-            </a:solidFill>
-          </a:ln>
-          <a:effectLst/>
-        </p:spPr>
-        <p:style>
-          <a:lnRef idx="1">
-            <a:schemeClr val="accent3"/>
-          </a:lnRef>
-          <a:fillRef idx="2">
-            <a:schemeClr val="accent3"/>
-          </a:fillRef>
-          <a:effectRef idx="1">
-            <a:schemeClr val="accent3"/>
-          </a:effectRef>
-          <a:fontRef idx="minor">
-            <a:schemeClr val="dk1"/>
-          </a:fontRef>
-        </p:style>
-        <p:txBody>
-          <a:bodyPr rtlCol="0" anchor="ctr"/>
-          <a:lstStyle/>
-          <a:p>
-            <a:pPr algn="ctr"/>
-            <a:endParaRPr lang="en-SG" sz="1400"/>
-          </a:p>
-        </p:txBody>
-      </p:sp>
-      <p:cxnSp>
-        <p:nvCxnSpPr>
-          <p:cNvPr id="94" name="Straight Arrow Connector 93"/>
-          <p:cNvCxnSpPr/>
-          <p:nvPr/>
-        </p:nvCxnSpPr>
-        <p:spPr>
-          <a:xfrm>
-            <a:off x="6770990" y="8090879"/>
-            <a:ext cx="1329054" cy="2501"/>
-          </a:xfrm>
-          <a:prstGeom prst="straightConnector1">
-            <a:avLst/>
-          </a:prstGeom>
-          <a:ln w="19050">
-            <a:solidFill>
-              <a:schemeClr val="accent1"/>
-            </a:solidFill>
-            <a:prstDash val="sysDash"/>
-            <a:headEnd type="arrow" w="med" len="med"/>
-            <a:tailEnd type="none" w="med" len="med"/>
-          </a:ln>
-        </p:spPr>
-        <p:style>
-          <a:lnRef idx="1">
-            <a:schemeClr val="accent1"/>
-          </a:lnRef>
-          <a:fillRef idx="0">
-            <a:schemeClr val="accent1"/>
-          </a:fillRef>
-          <a:effectRef idx="0">
-            <a:schemeClr val="accent1"/>
-          </a:effectRef>
-          <a:fontRef idx="minor">
-            <a:schemeClr val="tx1"/>
-          </a:fontRef>
-        </p:style>
-      </p:cxnSp>
-      <p:sp>
-        <p:nvSpPr>
-          <p:cNvPr id="95" name="Rectangle 94"/>
-          <p:cNvSpPr/>
-          <p:nvPr/>
-        </p:nvSpPr>
-        <p:spPr>
-          <a:xfrm>
-            <a:off x="12918118" y="8629158"/>
-            <a:ext cx="170216" cy="1003792"/>
-          </a:xfrm>
-          <a:prstGeom prst="rect">
-            <a:avLst/>
-          </a:prstGeom>
-          <a:solidFill>
-            <a:srgbClr val="0070C0"/>
-          </a:solidFill>
-          <a:ln>
-            <a:solidFill>
-              <a:srgbClr val="0070C0"/>
-            </a:solidFill>
-          </a:ln>
-          <a:effectLst/>
-        </p:spPr>
-        <p:style>
-          <a:lnRef idx="1">
-            <a:schemeClr val="accent3"/>
-          </a:lnRef>
-          <a:fillRef idx="2">
-            <a:schemeClr val="accent3"/>
-          </a:fillRef>
-          <a:effectRef idx="1">
-            <a:schemeClr val="accent3"/>
-          </a:effectRef>
-          <a:fontRef idx="minor">
-            <a:schemeClr val="dk1"/>
-          </a:fontRef>
-        </p:style>
-        <p:txBody>
-          <a:bodyPr rtlCol="0" anchor="ctr"/>
-          <a:lstStyle/>
-          <a:p>
-            <a:pPr algn="ctr"/>
-            <a:endParaRPr lang="en-SG" sz="1400"/>
-          </a:p>
-        </p:txBody>
-      </p:sp>
-      <p:cxnSp>
-        <p:nvCxnSpPr>
-          <p:cNvPr id="96" name="Straight Arrow Connector 95"/>
-          <p:cNvCxnSpPr/>
-          <p:nvPr/>
-        </p:nvCxnSpPr>
-        <p:spPr>
-          <a:xfrm flipV="1">
-            <a:off x="4322642" y="8629157"/>
-            <a:ext cx="8584150" cy="7242"/>
-          </a:xfrm>
-          <a:prstGeom prst="straightConnector1">
-            <a:avLst/>
-          </a:prstGeom>
-          <a:ln w="19050">
-            <a:solidFill>
-              <a:srgbClr val="0070C0"/>
-            </a:solidFill>
-            <a:tailEnd type="arrow"/>
-          </a:ln>
-        </p:spPr>
-        <p:style>
-          <a:lnRef idx="1">
-            <a:schemeClr val="accent1"/>
-          </a:lnRef>
-          <a:fillRef idx="0">
-            <a:schemeClr val="accent1"/>
-          </a:fillRef>
-          <a:effectRef idx="0">
-            <a:schemeClr val="accent1"/>
-          </a:effectRef>
-          <a:fontRef idx="minor">
-            <a:schemeClr val="tx1"/>
-          </a:fontRef>
-        </p:style>
-      </p:cxnSp>
-      <p:sp>
-        <p:nvSpPr>
-          <p:cNvPr id="103" name="Rectangle 102"/>
-          <p:cNvSpPr/>
-          <p:nvPr/>
-        </p:nvSpPr>
-        <p:spPr>
-          <a:xfrm>
-            <a:off x="4138096" y="9632950"/>
-            <a:ext cx="199686" cy="527591"/>
-          </a:xfrm>
-          <a:prstGeom prst="rect">
-            <a:avLst/>
-          </a:prstGeom>
-          <a:solidFill>
-            <a:srgbClr val="0070C0"/>
-          </a:solidFill>
-          <a:ln>
-            <a:solidFill>
-              <a:srgbClr val="0070C0"/>
-            </a:solidFill>
-          </a:ln>
-          <a:effectLst/>
-        </p:spPr>
-        <p:style>
-          <a:lnRef idx="1">
-            <a:schemeClr val="accent3"/>
-          </a:lnRef>
-          <a:fillRef idx="2">
-            <a:schemeClr val="accent3"/>
-          </a:fillRef>
-          <a:effectRef idx="1">
-            <a:schemeClr val="accent3"/>
-          </a:effectRef>
-          <a:fontRef idx="minor">
-            <a:schemeClr val="dk1"/>
-          </a:fontRef>
-        </p:style>
-        <p:txBody>
-          <a:bodyPr rtlCol="0" anchor="ctr"/>
-          <a:lstStyle/>
-          <a:p>
-            <a:pPr algn="ctr"/>
-            <a:endParaRPr lang="en-SG" sz="1400"/>
-          </a:p>
-        </p:txBody>
-      </p:sp>
-      <p:cxnSp>
-        <p:nvCxnSpPr>
-          <p:cNvPr id="121" name="Straight Connector 120"/>
-          <p:cNvCxnSpPr>
-            <a:cxnSpLocks/>
-            <a:stCxn id="59" idx="2"/>
-          </p:cNvCxnSpPr>
-          <p:nvPr/>
-        </p:nvCxnSpPr>
-        <p:spPr>
-          <a:xfrm>
-            <a:off x="9354362" y="5624330"/>
-            <a:ext cx="0" cy="386227"/>
-          </a:xfrm>
-          <a:prstGeom prst="line">
-            <a:avLst/>
-          </a:prstGeom>
-          <a:ln w="19050">
-            <a:solidFill>
-              <a:srgbClr val="0070C0"/>
-            </a:solidFill>
-            <a:prstDash val="sysDash"/>
-          </a:ln>
-          <a:effectLst/>
-        </p:spPr>
-        <p:style>
-          <a:lnRef idx="1">
-            <a:schemeClr val="accent1"/>
-          </a:lnRef>
-          <a:fillRef idx="2">
-            <a:schemeClr val="accent1"/>
-          </a:fillRef>
-          <a:effectRef idx="1">
-            <a:schemeClr val="accent1"/>
-          </a:effectRef>
-          <a:fontRef idx="minor">
-            <a:schemeClr val="dk1"/>
-          </a:fontRef>
-        </p:style>
-      </p:cxnSp>
-      <p:sp>
-        <p:nvSpPr>
-          <p:cNvPr id="125" name="TextBox 124"/>
+              <a:t>()</a:t>
+            </a:r>
+          </a:p>
+        </p:txBody>
+      </p:sp>
+      <p:sp>
+        <p:nvSpPr>
+          <p:cNvPr id="128" name="TextBox 127"/>
           <p:cNvSpPr txBox="1"/>
           <p:nvPr/>
         </p:nvSpPr>
         <p:spPr>
           <a:xfrm>
-            <a:off x="8431215" y="6127750"/>
+            <a:off x="6967808" y="4403389"/>
             <a:ext cx="855809" cy="215444"/>
           </a:xfrm>
           <a:prstGeom prst="rect">
@@ -5700,23 +5613,109 @@
               <a:rPr lang="en-US" dirty="0" err="1"/>
               <a:t>isFileExist</a:t>
             </a:r>
-            <a:r>
-              <a:rPr lang="en-US" dirty="0"/>
-              <a:t>()</a:t>
-            </a:r>
-          </a:p>
-        </p:txBody>
-      </p:sp>
-      <p:sp>
-        <p:nvSpPr>
-          <p:cNvPr id="128" name="TextBox 127"/>
+            <a:endParaRPr lang="en-US" dirty="0"/>
+          </a:p>
+        </p:txBody>
+      </p:sp>
+      <p:sp>
+        <p:nvSpPr>
+          <p:cNvPr id="130" name="Snip Single Corner Rectangle 129"/>
+          <p:cNvSpPr/>
+          <p:nvPr/>
+        </p:nvSpPr>
+        <p:spPr>
+          <a:xfrm rot="10800000" flipH="1">
+            <a:off x="6779670" y="4385650"/>
+            <a:ext cx="284740" cy="233182"/>
+          </a:xfrm>
+          <a:prstGeom prst="snip1Rect">
+            <a:avLst/>
+          </a:prstGeom>
+          <a:noFill/>
+        </p:spPr>
+        <p:style>
+          <a:lnRef idx="2">
+            <a:schemeClr val="accent1">
+              <a:shade val="50000"/>
+            </a:schemeClr>
+          </a:lnRef>
+          <a:fillRef idx="1">
+            <a:schemeClr val="accent1"/>
+          </a:fillRef>
+          <a:effectRef idx="0">
+            <a:schemeClr val="accent1"/>
+          </a:effectRef>
+          <a:fontRef idx="minor">
+            <a:schemeClr val="lt1"/>
+          </a:fontRef>
+        </p:style>
+        <p:txBody>
+          <a:bodyPr rot="0" spcFirstLastPara="0" vertOverflow="overflow" horzOverflow="overflow" vert="horz" wrap="square" lIns="91440" tIns="45720" rIns="91440" bIns="45720" numCol="1" spcCol="0" rtlCol="0" fromWordArt="0" anchor="ctr" anchorCtr="0" forceAA="0" compatLnSpc="1">
+            <a:prstTxWarp prst="textNoShape">
+              <a:avLst/>
+            </a:prstTxWarp>
+            <a:noAutofit/>
+          </a:bodyPr>
+          <a:lstStyle/>
+          <a:p>
+            <a:pPr algn="ctr"/>
+            <a:endParaRPr lang="en-US" dirty="0">
+              <a:solidFill>
+                <a:schemeClr val="tx2">
+                  <a:lumMod val="60000"/>
+                  <a:lumOff val="40000"/>
+                </a:schemeClr>
+              </a:solidFill>
+            </a:endParaRPr>
+          </a:p>
+        </p:txBody>
+      </p:sp>
+      <p:sp>
+        <p:nvSpPr>
+          <p:cNvPr id="132" name="TextBox 131"/>
           <p:cNvSpPr txBox="1"/>
           <p:nvPr/>
         </p:nvSpPr>
         <p:spPr>
           <a:xfrm>
-            <a:off x="7133668" y="7105861"/>
-            <a:ext cx="855809" cy="215444"/>
+            <a:off x="6759172" y="4357223"/>
+            <a:ext cx="330540" cy="261610"/>
+          </a:xfrm>
+          <a:prstGeom prst="rect">
+            <a:avLst/>
+          </a:prstGeom>
+          <a:noFill/>
+        </p:spPr>
+        <p:txBody>
+          <a:bodyPr wrap="none" rtlCol="0">
+            <a:spAutoFit/>
+          </a:bodyPr>
+          <a:lstStyle/>
+          <a:p>
+            <a:r>
+              <a:rPr lang="en-US" sz="1100" dirty="0">
+                <a:solidFill>
+                  <a:schemeClr val="tx2">
+                    <a:lumMod val="60000"/>
+                    <a:lumOff val="40000"/>
+                  </a:schemeClr>
+                </a:solidFill>
+              </a:rPr>
+              <a:t>alt</a:t>
+            </a:r>
+          </a:p>
+        </p:txBody>
+      </p:sp>
+      <p:sp>
+        <p:nvSpPr>
+          <p:cNvPr id="133" name="TextBox 132"/>
+          <p:cNvSpPr txBox="1"/>
+          <p:nvPr/>
+        </p:nvSpPr>
+        <p:spPr>
+          <a:xfrm>
+            <a:off x="8190708" y="4433033"/>
+            <a:ext cx="1177515" cy="215444"/>
           </a:xfrm>
           <a:prstGeom prst="rect">
             <a:avLst/>
@@ -5742,7 +5741,11 @@
           <a:p>
             <a:r>
               <a:rPr lang="en-US" dirty="0" err="1"/>
-              <a:t>isFileExist</a:t>
+              <a:t>readFromFile</a:t>
+            </a:r>
+            <a:r>
+              <a:rPr lang="en-US" dirty="0"/>
+              <a:t>(f)</a:t>
             </a:r>
             <a:endParaRPr lang="en-US" dirty="0"/>
           </a:p>
@@ -5750,14 +5753,736 @@
       </p:sp>
       <p:sp>
         <p:nvSpPr>
-          <p:cNvPr id="130" name="Snip Single Corner Rectangle 129"/>
+          <p:cNvPr id="154" name="Rectangle 153"/>
           <p:cNvSpPr/>
           <p:nvPr/>
         </p:nvSpPr>
         <p:spPr>
+          <a:xfrm>
+            <a:off x="2936202" y="8066078"/>
+            <a:ext cx="225304" cy="451442"/>
+          </a:xfrm>
+          <a:prstGeom prst="rect">
+            <a:avLst/>
+          </a:prstGeom>
+          <a:solidFill>
+            <a:srgbClr val="0070C0"/>
+          </a:solidFill>
+          <a:ln>
+            <a:solidFill>
+              <a:srgbClr val="0070C0"/>
+            </a:solidFill>
+          </a:ln>
+          <a:effectLst/>
+        </p:spPr>
+        <p:style>
+          <a:lnRef idx="1">
+            <a:schemeClr val="accent3"/>
+          </a:lnRef>
+          <a:fillRef idx="2">
+            <a:schemeClr val="accent3"/>
+          </a:fillRef>
+          <a:effectRef idx="1">
+            <a:schemeClr val="accent3"/>
+          </a:effectRef>
+          <a:fontRef idx="minor">
+            <a:schemeClr val="dk1"/>
+          </a:fontRef>
+        </p:style>
+        <p:txBody>
+          <a:bodyPr rtlCol="0" anchor="ctr"/>
+          <a:lstStyle/>
+          <a:p>
+            <a:pPr algn="ctr"/>
+            <a:endParaRPr lang="en-SG" sz="1400"/>
+          </a:p>
+        </p:txBody>
+      </p:sp>
+      <p:cxnSp>
+        <p:nvCxnSpPr>
+          <p:cNvPr id="74" name="Straight Arrow Connector 73"/>
+          <p:cNvCxnSpPr/>
+          <p:nvPr/>
+        </p:nvCxnSpPr>
+        <p:spPr>
+          <a:xfrm>
+            <a:off x="5613530" y="2682932"/>
+            <a:ext cx="2330474" cy="0"/>
+          </a:xfrm>
+          <a:prstGeom prst="straightConnector1">
+            <a:avLst/>
+          </a:prstGeom>
+          <a:ln w="19050">
+            <a:solidFill>
+              <a:srgbClr val="0070C0"/>
+            </a:solidFill>
+            <a:tailEnd type="arrow"/>
+          </a:ln>
+        </p:spPr>
+        <p:style>
+          <a:lnRef idx="1">
+            <a:schemeClr val="accent1"/>
+          </a:lnRef>
+          <a:fillRef idx="0">
+            <a:schemeClr val="accent1"/>
+          </a:fillRef>
+          <a:effectRef idx="0">
+            <a:schemeClr val="accent1"/>
+          </a:effectRef>
+          <a:fontRef idx="minor">
+            <a:schemeClr val="tx1"/>
+          </a:fontRef>
+        </p:style>
+      </p:cxnSp>
+      <p:sp>
+        <p:nvSpPr>
+          <p:cNvPr id="75" name="TextBox 74"/>
+          <p:cNvSpPr txBox="1"/>
+          <p:nvPr/>
+        </p:nvSpPr>
+        <p:spPr>
+          <a:xfrm>
+            <a:off x="6277432" y="2450157"/>
+            <a:ext cx="1424846" cy="215444"/>
+          </a:xfrm>
+          <a:prstGeom prst="rect">
+            <a:avLst/>
+          </a:prstGeom>
+          <a:noFill/>
+        </p:spPr>
+        <p:txBody>
+          <a:bodyPr wrap="square" lIns="0" tIns="0" rIns="0" bIns="0" rtlCol="0">
+            <a:spAutoFit/>
+          </a:bodyPr>
+          <a:lstStyle/>
+          <a:p>
+            <a:pPr algn="r"/>
+            <a:r>
+              <a:rPr lang="en-US" sz="1400" dirty="0">
+                <a:solidFill>
+                  <a:srgbClr val="0070C0"/>
+                </a:solidFill>
+              </a:rPr>
+              <a:t>parse(</a:t>
+            </a:r>
+            <a:r>
+              <a:rPr lang="en-US" sz="1400" dirty="0" err="1">
+                <a:solidFill>
+                  <a:srgbClr val="0070C0"/>
+                </a:solidFill>
+              </a:rPr>
+              <a:t>args</a:t>
+            </a:r>
+            <a:r>
+              <a:rPr lang="en-US" sz="1400" dirty="0">
+                <a:solidFill>
+                  <a:srgbClr val="0070C0"/>
+                </a:solidFill>
+              </a:rPr>
+              <a:t>)</a:t>
+            </a:r>
+            <a:endParaRPr lang="en-US" sz="1400" dirty="0">
+              <a:solidFill>
+                <a:srgbClr val="0070C0"/>
+              </a:solidFill>
+            </a:endParaRPr>
+          </a:p>
+        </p:txBody>
+      </p:sp>
+      <p:sp>
+        <p:nvSpPr>
+          <p:cNvPr id="77" name="TextBox 76"/>
+          <p:cNvSpPr txBox="1"/>
+          <p:nvPr/>
+        </p:nvSpPr>
+        <p:spPr>
+          <a:xfrm>
+            <a:off x="7484405" y="2588420"/>
+            <a:ext cx="1424846" cy="215444"/>
+          </a:xfrm>
+          <a:prstGeom prst="rect">
+            <a:avLst/>
+          </a:prstGeom>
+          <a:noFill/>
+        </p:spPr>
+        <p:txBody>
+          <a:bodyPr wrap="square" lIns="0" tIns="0" rIns="0" bIns="0" rtlCol="0">
+            <a:spAutoFit/>
+          </a:bodyPr>
+          <a:lstStyle/>
+          <a:p>
+            <a:pPr algn="r"/>
+            <a:r>
+              <a:rPr lang="en-US" sz="1400" dirty="0">
+                <a:solidFill>
+                  <a:srgbClr val="0070C0"/>
+                </a:solidFill>
+              </a:rPr>
+              <a:t>F</a:t>
+            </a:r>
+            <a:r>
+              <a:rPr lang="en-US" sz="1400">
+                <a:solidFill>
+                  <a:srgbClr val="0070C0"/>
+                </a:solidFill>
+              </a:rPr>
+              <a:t>ile(</a:t>
+            </a:r>
+            <a:r>
+              <a:rPr lang="en-US" sz="1400" dirty="0" err="1">
+                <a:solidFill>
+                  <a:srgbClr val="0070C0"/>
+                </a:solidFill>
+              </a:rPr>
+              <a:t>args</a:t>
+            </a:r>
+            <a:r>
+              <a:rPr lang="en-US" sz="1400" dirty="0">
+                <a:solidFill>
+                  <a:srgbClr val="0070C0"/>
+                </a:solidFill>
+              </a:rPr>
+              <a:t>))</a:t>
+            </a:r>
+            <a:endParaRPr lang="en-US" sz="1400" dirty="0">
+              <a:solidFill>
+                <a:srgbClr val="0070C0"/>
+              </a:solidFill>
+            </a:endParaRPr>
+          </a:p>
+        </p:txBody>
+      </p:sp>
+      <p:sp>
+        <p:nvSpPr>
+          <p:cNvPr id="79" name="TextBox 78"/>
+          <p:cNvSpPr txBox="1"/>
+          <p:nvPr/>
+        </p:nvSpPr>
+        <p:spPr>
+          <a:xfrm>
+            <a:off x="7874677" y="3014949"/>
+            <a:ext cx="603232" cy="215444"/>
+          </a:xfrm>
+          <a:prstGeom prst="rect">
+            <a:avLst/>
+          </a:prstGeom>
+          <a:noFill/>
+        </p:spPr>
+        <p:txBody>
+          <a:bodyPr wrap="square" lIns="0" tIns="0" rIns="0" bIns="0" rtlCol="0">
+            <a:spAutoFit/>
+          </a:bodyPr>
+          <a:lstStyle/>
+          <a:p>
+            <a:pPr algn="r"/>
+            <a:r>
+              <a:rPr lang="en-US" sz="1400">
+                <a:solidFill>
+                  <a:srgbClr val="0070C0"/>
+                </a:solidFill>
+              </a:rPr>
+              <a:t>f</a:t>
+            </a:r>
+            <a:endParaRPr lang="en-US" sz="1400" dirty="0">
+              <a:solidFill>
+                <a:srgbClr val="0070C0"/>
+              </a:solidFill>
+            </a:endParaRPr>
+          </a:p>
+        </p:txBody>
+      </p:sp>
+      <p:cxnSp>
+        <p:nvCxnSpPr>
+          <p:cNvPr id="81" name="Straight Connector 80"/>
+          <p:cNvCxnSpPr>
+            <a:cxnSpLocks/>
+            <a:stCxn id="68" idx="2"/>
+          </p:cNvCxnSpPr>
+          <p:nvPr/>
+        </p:nvCxnSpPr>
+        <p:spPr>
+          <a:xfrm>
+            <a:off x="9886998" y="1060496"/>
+            <a:ext cx="2846" cy="4191054"/>
+          </a:xfrm>
+          <a:prstGeom prst="line">
+            <a:avLst/>
+          </a:prstGeom>
+          <a:ln w="19050">
+            <a:solidFill>
+              <a:srgbClr val="0070C0"/>
+            </a:solidFill>
+            <a:prstDash val="sysDash"/>
+          </a:ln>
+          <a:effectLst/>
+        </p:spPr>
+        <p:style>
+          <a:lnRef idx="1">
+            <a:schemeClr val="accent1"/>
+          </a:lnRef>
+          <a:fillRef idx="2">
+            <a:schemeClr val="accent1"/>
+          </a:fillRef>
+          <a:effectRef idx="1">
+            <a:schemeClr val="accent1"/>
+          </a:effectRef>
+          <a:fontRef idx="minor">
+            <a:schemeClr val="dk1"/>
+          </a:fontRef>
+        </p:style>
+      </p:cxnSp>
+      <p:sp>
+        <p:nvSpPr>
+          <p:cNvPr id="90" name="TextBox 89"/>
+          <p:cNvSpPr txBox="1"/>
+          <p:nvPr/>
+        </p:nvSpPr>
+        <p:spPr>
+          <a:xfrm>
+            <a:off x="8045834" y="4761242"/>
+            <a:ext cx="649661" cy="215444"/>
+          </a:xfrm>
+          <a:prstGeom prst="rect">
+            <a:avLst/>
+          </a:prstGeom>
+          <a:noFill/>
+        </p:spPr>
+        <p:txBody>
+          <a:bodyPr wrap="square" lIns="0" tIns="0" rIns="0" bIns="0" rtlCol="0">
+            <a:spAutoFit/>
+          </a:bodyPr>
+          <a:lstStyle/>
+          <a:p>
+            <a:pPr algn="r"/>
+            <a:r>
+              <a:rPr lang="en-US" sz="1400" dirty="0">
+                <a:solidFill>
+                  <a:srgbClr val="0070C0"/>
+                </a:solidFill>
+              </a:rPr>
+              <a:t>d</a:t>
+            </a:r>
+            <a:endParaRPr lang="en-US" sz="1400" dirty="0">
+              <a:solidFill>
+                <a:srgbClr val="0070C0"/>
+              </a:solidFill>
+            </a:endParaRPr>
+          </a:p>
+        </p:txBody>
+      </p:sp>
+      <p:sp>
+        <p:nvSpPr>
+          <p:cNvPr id="98" name="Rectangle 97"/>
+          <p:cNvSpPr/>
+          <p:nvPr/>
+        </p:nvSpPr>
+        <p:spPr>
+          <a:xfrm>
+            <a:off x="7985920" y="2646173"/>
+            <a:ext cx="168568" cy="5302013"/>
+          </a:xfrm>
+          <a:prstGeom prst="rect">
+            <a:avLst/>
+          </a:prstGeom>
+          <a:solidFill>
+            <a:srgbClr val="0070C0"/>
+          </a:solidFill>
+          <a:ln>
+            <a:solidFill>
+              <a:srgbClr val="0070C0"/>
+            </a:solidFill>
+          </a:ln>
+          <a:effectLst/>
+        </p:spPr>
+        <p:style>
+          <a:lnRef idx="1">
+            <a:schemeClr val="accent3"/>
+          </a:lnRef>
+          <a:fillRef idx="2">
+            <a:schemeClr val="accent3"/>
+          </a:fillRef>
+          <a:effectRef idx="1">
+            <a:schemeClr val="accent3"/>
+          </a:effectRef>
+          <a:fontRef idx="minor">
+            <a:schemeClr val="dk1"/>
+          </a:fontRef>
+        </p:style>
+        <p:txBody>
+          <a:bodyPr rtlCol="0" anchor="ctr"/>
+          <a:lstStyle/>
+          <a:p>
+            <a:pPr algn="ctr"/>
+            <a:endParaRPr lang="en-SG" sz="1400"/>
+          </a:p>
+        </p:txBody>
+      </p:sp>
+      <p:sp>
+        <p:nvSpPr>
+          <p:cNvPr id="97" name="Rectangle 96"/>
+          <p:cNvSpPr/>
+          <p:nvPr/>
+        </p:nvSpPr>
+        <p:spPr>
+          <a:xfrm>
+            <a:off x="8069544" y="5433162"/>
+            <a:ext cx="196758" cy="1483686"/>
+          </a:xfrm>
+          <a:prstGeom prst="rect">
+            <a:avLst/>
+          </a:prstGeom>
+          <a:ln/>
+        </p:spPr>
+        <p:style>
+          <a:lnRef idx="2">
+            <a:schemeClr val="accent1">
+              <a:shade val="50000"/>
+            </a:schemeClr>
+          </a:lnRef>
+          <a:fillRef idx="1">
+            <a:schemeClr val="accent1"/>
+          </a:fillRef>
+          <a:effectRef idx="0">
+            <a:schemeClr val="accent1"/>
+          </a:effectRef>
+          <a:fontRef idx="minor">
+            <a:schemeClr val="lt1"/>
+          </a:fontRef>
+        </p:style>
+        <p:txBody>
+          <a:bodyPr rtlCol="0" anchor="ctr"/>
+          <a:lstStyle/>
+          <a:p>
+            <a:pPr algn="ctr"/>
+            <a:endParaRPr lang="en-SG" sz="1400"/>
+          </a:p>
+        </p:txBody>
+      </p:sp>
+      <p:cxnSp>
+        <p:nvCxnSpPr>
+          <p:cNvPr id="53" name="Curved Connector 52"/>
+          <p:cNvCxnSpPr/>
+          <p:nvPr/>
+        </p:nvCxnSpPr>
+        <p:spPr>
+          <a:xfrm>
+            <a:off x="8038308" y="5273363"/>
+            <a:ext cx="260475" cy="170732"/>
+          </a:xfrm>
+          <a:prstGeom prst="curvedConnector3">
+            <a:avLst>
+              <a:gd name="adj1" fmla="val 181644"/>
+            </a:avLst>
+          </a:prstGeom>
+          <a:ln>
+            <a:tailEnd type="triangle"/>
+          </a:ln>
+        </p:spPr>
+        <p:style>
+          <a:lnRef idx="1">
+            <a:schemeClr val="accent1"/>
+          </a:lnRef>
+          <a:fillRef idx="0">
+            <a:schemeClr val="accent1"/>
+          </a:fillRef>
+          <a:effectRef idx="0">
+            <a:schemeClr val="accent1"/>
+          </a:effectRef>
+          <a:fontRef idx="minor">
+            <a:schemeClr val="tx1"/>
+          </a:fontRef>
+        </p:style>
+      </p:cxnSp>
+      <p:sp>
+        <p:nvSpPr>
+          <p:cNvPr id="123" name="TextBox 122"/>
+          <p:cNvSpPr txBox="1"/>
+          <p:nvPr/>
+        </p:nvSpPr>
+        <p:spPr>
+          <a:xfrm>
+            <a:off x="8533601" y="5197661"/>
+            <a:ext cx="2400763" cy="215444"/>
+          </a:xfrm>
+          <a:prstGeom prst="rect">
+            <a:avLst/>
+          </a:prstGeom>
+          <a:noFill/>
+        </p:spPr>
+        <p:txBody>
+          <a:bodyPr wrap="square" lIns="0" tIns="0" rIns="0" bIns="0" rtlCol="0">
+            <a:spAutoFit/>
+          </a:bodyPr>
+          <a:lstStyle/>
+          <a:p>
+            <a:r>
+              <a:rPr lang="en-US" sz="1400" dirty="0" err="1">
+                <a:solidFill>
+                  <a:srgbClr val="0070C0"/>
+                </a:solidFill>
+              </a:rPr>
+              <a:t>parseParticularsIntoPersonList</a:t>
+            </a:r>
+            <a:r>
+              <a:rPr lang="en-US" sz="1400" dirty="0">
+                <a:solidFill>
+                  <a:srgbClr val="0070C0"/>
+                </a:solidFill>
+              </a:rPr>
+              <a:t>(d)</a:t>
+            </a:r>
+            <a:endParaRPr lang="en-US" sz="1400" dirty="0">
+              <a:solidFill>
+                <a:srgbClr val="0070C0"/>
+              </a:solidFill>
+            </a:endParaRPr>
+          </a:p>
+        </p:txBody>
+      </p:sp>
+      <p:sp>
+        <p:nvSpPr>
+          <p:cNvPr id="126" name="Rectangle 125"/>
+          <p:cNvSpPr/>
+          <p:nvPr/>
+        </p:nvSpPr>
+        <p:spPr>
+          <a:xfrm>
+            <a:off x="8190706" y="5964971"/>
+            <a:ext cx="159220" cy="683312"/>
+          </a:xfrm>
+          <a:prstGeom prst="rect">
+            <a:avLst/>
+          </a:prstGeom>
+          <a:solidFill>
+            <a:srgbClr val="0070C0"/>
+          </a:solidFill>
+          <a:ln>
+            <a:solidFill>
+              <a:srgbClr val="0070C0"/>
+            </a:solidFill>
+          </a:ln>
+          <a:effectLst/>
+        </p:spPr>
+        <p:style>
+          <a:lnRef idx="1">
+            <a:schemeClr val="accent3"/>
+          </a:lnRef>
+          <a:fillRef idx="2">
+            <a:schemeClr val="accent3"/>
+          </a:fillRef>
+          <a:effectRef idx="1">
+            <a:schemeClr val="accent3"/>
+          </a:effectRef>
+          <a:fontRef idx="minor">
+            <a:schemeClr val="dk1"/>
+          </a:fontRef>
+        </p:style>
+        <p:txBody>
+          <a:bodyPr rtlCol="0" anchor="ctr"/>
+          <a:lstStyle/>
+          <a:p>
+            <a:pPr algn="ctr"/>
+            <a:endParaRPr lang="en-SG" sz="1400"/>
+          </a:p>
+        </p:txBody>
+      </p:sp>
+      <p:cxnSp>
+        <p:nvCxnSpPr>
+          <p:cNvPr id="127" name="Curved Connector 126"/>
+          <p:cNvCxnSpPr/>
+          <p:nvPr/>
+        </p:nvCxnSpPr>
+        <p:spPr>
+          <a:xfrm>
+            <a:off x="8095209" y="5788820"/>
+            <a:ext cx="260475" cy="170732"/>
+          </a:xfrm>
+          <a:prstGeom prst="curvedConnector3">
+            <a:avLst>
+              <a:gd name="adj1" fmla="val 181644"/>
+            </a:avLst>
+          </a:prstGeom>
+          <a:ln>
+            <a:tailEnd type="triangle"/>
+          </a:ln>
+        </p:spPr>
+        <p:style>
+          <a:lnRef idx="1">
+            <a:schemeClr val="accent1"/>
+          </a:lnRef>
+          <a:fillRef idx="0">
+            <a:schemeClr val="accent1"/>
+          </a:fillRef>
+          <a:effectRef idx="0">
+            <a:schemeClr val="accent1"/>
+          </a:effectRef>
+          <a:fontRef idx="minor">
+            <a:schemeClr val="tx1"/>
+          </a:fontRef>
+        </p:style>
+      </p:cxnSp>
+      <p:sp>
+        <p:nvSpPr>
+          <p:cNvPr id="129" name="TextBox 128"/>
+          <p:cNvSpPr txBox="1"/>
+          <p:nvPr/>
+        </p:nvSpPr>
+        <p:spPr>
+          <a:xfrm>
+            <a:off x="8603727" y="5764100"/>
+            <a:ext cx="2715430" cy="215444"/>
+          </a:xfrm>
+          <a:prstGeom prst="rect">
+            <a:avLst/>
+          </a:prstGeom>
+          <a:noFill/>
+        </p:spPr>
+        <p:txBody>
+          <a:bodyPr wrap="square" lIns="0" tIns="0" rIns="0" bIns="0" rtlCol="0">
+            <a:spAutoFit/>
+          </a:bodyPr>
+          <a:lstStyle/>
+          <a:p>
+            <a:r>
+              <a:rPr lang="en-US" sz="1400" dirty="0" err="1">
+                <a:solidFill>
+                  <a:srgbClr val="0070C0"/>
+                </a:solidFill>
+              </a:rPr>
+              <a:t>parseParticularsIntoPerson</a:t>
+            </a:r>
+            <a:r>
+              <a:rPr lang="en-US" sz="1400" dirty="0">
+                <a:solidFill>
+                  <a:srgbClr val="0070C0"/>
+                </a:solidFill>
+              </a:rPr>
+              <a:t>(</a:t>
+            </a:r>
+            <a:r>
+              <a:rPr lang="en-US" sz="1400" dirty="0" err="1">
+                <a:solidFill>
+                  <a:srgbClr val="0070C0"/>
+                </a:solidFill>
+              </a:rPr>
+              <a:t>argsMap</a:t>
+            </a:r>
+            <a:r>
+              <a:rPr lang="en-US" sz="1400" dirty="0">
+                <a:solidFill>
+                  <a:srgbClr val="0070C0"/>
+                </a:solidFill>
+              </a:rPr>
+              <a:t>)</a:t>
+            </a:r>
+            <a:endParaRPr lang="en-US" sz="1400" dirty="0">
+              <a:solidFill>
+                <a:srgbClr val="0070C0"/>
+              </a:solidFill>
+            </a:endParaRPr>
+          </a:p>
+        </p:txBody>
+      </p:sp>
+      <p:sp>
+        <p:nvSpPr>
+          <p:cNvPr id="131" name="Rectangle 130"/>
+          <p:cNvSpPr/>
+          <p:nvPr/>
+        </p:nvSpPr>
+        <p:spPr>
+          <a:xfrm>
+            <a:off x="6658243" y="5564064"/>
+            <a:ext cx="2523065" cy="1230728"/>
+          </a:xfrm>
+          <a:prstGeom prst="rect">
+            <a:avLst/>
+          </a:prstGeom>
+          <a:noFill/>
+        </p:spPr>
+        <p:style>
+          <a:lnRef idx="2">
+            <a:schemeClr val="accent1">
+              <a:shade val="50000"/>
+            </a:schemeClr>
+          </a:lnRef>
+          <a:fillRef idx="1">
+            <a:schemeClr val="accent1"/>
+          </a:fillRef>
+          <a:effectRef idx="0">
+            <a:schemeClr val="accent1"/>
+          </a:effectRef>
+          <a:fontRef idx="minor">
+            <a:schemeClr val="lt1"/>
+          </a:fontRef>
+        </p:style>
+        <p:txBody>
+          <a:bodyPr rot="0" spcFirstLastPara="0" vertOverflow="overflow" horzOverflow="overflow" vert="horz" wrap="square" lIns="91440" tIns="45720" rIns="91440" bIns="45720" numCol="1" spcCol="0" rtlCol="0" fromWordArt="0" anchor="ctr" anchorCtr="0" forceAA="0" compatLnSpc="1">
+            <a:prstTxWarp prst="textNoShape">
+              <a:avLst/>
+            </a:prstTxWarp>
+            <a:noAutofit/>
+          </a:bodyPr>
+          <a:lstStyle/>
+          <a:p>
+            <a:pPr algn="ctr"/>
+            <a:endParaRPr lang="en-US"/>
+          </a:p>
+        </p:txBody>
+      </p:sp>
+      <p:sp>
+        <p:nvSpPr>
+          <p:cNvPr id="134" name="TextBox 133"/>
+          <p:cNvSpPr txBox="1"/>
+          <p:nvPr/>
+        </p:nvSpPr>
+        <p:spPr>
+          <a:xfrm>
+            <a:off x="6596304" y="5560220"/>
+            <a:ext cx="437940" cy="261610"/>
+          </a:xfrm>
+          <a:prstGeom prst="rect">
+            <a:avLst/>
+          </a:prstGeom>
+          <a:noFill/>
+        </p:spPr>
+        <p:txBody>
+          <a:bodyPr wrap="none" rtlCol="0">
+            <a:spAutoFit/>
+          </a:bodyPr>
+          <a:lstStyle/>
+          <a:p>
+            <a:r>
+              <a:rPr lang="en-US" sz="1100" dirty="0">
+                <a:solidFill>
+                  <a:schemeClr val="tx2">
+                    <a:lumMod val="60000"/>
+                    <a:lumOff val="40000"/>
+                  </a:schemeClr>
+                </a:solidFill>
+              </a:rPr>
+              <a:t>loop</a:t>
+            </a:r>
+            <a:endParaRPr lang="en-US" sz="1100" dirty="0">
+              <a:solidFill>
+                <a:schemeClr val="tx2">
+                  <a:lumMod val="60000"/>
+                  <a:lumOff val="40000"/>
+                </a:schemeClr>
+              </a:solidFill>
+            </a:endParaRPr>
+          </a:p>
+        </p:txBody>
+      </p:sp>
+      <p:sp>
+        <p:nvSpPr>
+          <p:cNvPr id="135" name="Snip Single Corner Rectangle 134"/>
+          <p:cNvSpPr/>
+          <p:nvPr/>
+        </p:nvSpPr>
+        <p:spPr>
           <a:xfrm rot="10800000" flipH="1">
-            <a:off x="6945533" y="7075746"/>
-            <a:ext cx="284740" cy="260122"/>
+            <a:off x="6662775" y="5573922"/>
+            <a:ext cx="284740" cy="233182"/>
           </a:xfrm>
           <a:prstGeom prst="snip1Rect">
             <a:avLst/>
@@ -5801,52 +6526,51 @@
           </a:p>
         </p:txBody>
       </p:sp>
-      <p:sp>
-        <p:nvSpPr>
-          <p:cNvPr id="132" name="TextBox 131"/>
+      <p:cxnSp>
+        <p:nvCxnSpPr>
+          <p:cNvPr id="136" name="Curved Connector 135"/>
+          <p:cNvCxnSpPr/>
+          <p:nvPr/>
+        </p:nvCxnSpPr>
+        <p:spPr>
+          <a:xfrm rot="10800000" flipV="1">
+            <a:off x="8283151" y="6627020"/>
+            <a:ext cx="136157" cy="90258"/>
+          </a:xfrm>
+          <a:prstGeom prst="curvedConnector3">
+            <a:avLst>
+              <a:gd name="adj1" fmla="val -124352"/>
+            </a:avLst>
+          </a:prstGeom>
+          <a:ln>
+            <a:tailEnd type="triangle"/>
+          </a:ln>
+        </p:spPr>
+        <p:style>
+          <a:lnRef idx="1">
+            <a:schemeClr val="accent1"/>
+          </a:lnRef>
+          <a:fillRef idx="0">
+            <a:schemeClr val="accent1"/>
+          </a:fillRef>
+          <a:effectRef idx="0">
+            <a:schemeClr val="accent1"/>
+          </a:effectRef>
+          <a:fontRef idx="minor">
+            <a:schemeClr val="tx1"/>
+          </a:fontRef>
+        </p:style>
+      </p:cxnSp>
+      <p:sp>
+        <p:nvSpPr>
+          <p:cNvPr id="145" name="TextBox 144"/>
           <p:cNvSpPr txBox="1"/>
           <p:nvPr/>
         </p:nvSpPr>
         <p:spPr>
           <a:xfrm>
-            <a:off x="6925035" y="7081191"/>
-            <a:ext cx="330540" cy="261610"/>
-          </a:xfrm>
-          <a:prstGeom prst="rect">
-            <a:avLst/>
-          </a:prstGeom>
-          <a:noFill/>
-        </p:spPr>
-        <p:txBody>
-          <a:bodyPr wrap="none" rtlCol="0">
-            <a:spAutoFit/>
-          </a:bodyPr>
-          <a:lstStyle/>
-          <a:p>
-            <a:r>
-              <a:rPr lang="en-US" sz="1100" dirty="0">
-                <a:solidFill>
-                  <a:schemeClr val="tx2">
-                    <a:lumMod val="60000"/>
-                    <a:lumOff val="40000"/>
-                  </a:schemeClr>
-                </a:solidFill>
-              </a:rPr>
-              <a:t>alt</a:t>
-            </a:r>
-          </a:p>
-        </p:txBody>
-      </p:sp>
-      <p:sp>
-        <p:nvSpPr>
-          <p:cNvPr id="133" name="TextBox 132"/>
-          <p:cNvSpPr txBox="1"/>
-          <p:nvPr/>
-        </p:nvSpPr>
-        <p:spPr>
-          <a:xfrm>
-            <a:off x="8440883" y="7237298"/>
-            <a:ext cx="855809" cy="215444"/>
+            <a:off x="6977306" y="5619206"/>
+            <a:ext cx="973793" cy="169277"/>
           </a:xfrm>
           <a:prstGeom prst="rect">
             <a:avLst/>
@@ -5870,23 +6594,229 @@
             </a:lvl1pPr>
           </a:lstStyle>
           <a:p>
-            <a:r>
-              <a:rPr lang="en-US" dirty="0"/>
-              <a:t>tokenize()</a:t>
-            </a:r>
-          </a:p>
-        </p:txBody>
-      </p:sp>
-      <p:sp>
-        <p:nvSpPr>
-          <p:cNvPr id="154" name="Rectangle 153"/>
+            <a:pPr algn="ctr"/>
+            <a:r>
+              <a:rPr lang="en-US" sz="1100" dirty="0"/>
+              <a:t>[all persons in d]</a:t>
+            </a:r>
+            <a:endParaRPr lang="en-US" sz="1100" dirty="0"/>
+          </a:p>
+        </p:txBody>
+      </p:sp>
+      <p:cxnSp>
+        <p:nvCxnSpPr>
+          <p:cNvPr id="146" name="Curved Connector 145"/>
+          <p:cNvCxnSpPr/>
+          <p:nvPr/>
+        </p:nvCxnSpPr>
+        <p:spPr>
+          <a:xfrm rot="10800000" flipV="1">
+            <a:off x="8130751" y="6917761"/>
+            <a:ext cx="136157" cy="90258"/>
+          </a:xfrm>
+          <a:prstGeom prst="curvedConnector3">
+            <a:avLst>
+              <a:gd name="adj1" fmla="val -124352"/>
+            </a:avLst>
+          </a:prstGeom>
+          <a:ln>
+            <a:tailEnd type="triangle"/>
+          </a:ln>
+        </p:spPr>
+        <p:style>
+          <a:lnRef idx="1">
+            <a:schemeClr val="accent1"/>
+          </a:lnRef>
+          <a:fillRef idx="0">
+            <a:schemeClr val="accent1"/>
+          </a:fillRef>
+          <a:effectRef idx="0">
+            <a:schemeClr val="accent1"/>
+          </a:effectRef>
+          <a:fontRef idx="minor">
+            <a:schemeClr val="tx1"/>
+          </a:fontRef>
+        </p:style>
+      </p:cxnSp>
+      <p:sp>
+        <p:nvSpPr>
+          <p:cNvPr id="147" name="TextBox 146"/>
+          <p:cNvSpPr txBox="1"/>
+          <p:nvPr/>
+        </p:nvSpPr>
+        <p:spPr>
+          <a:xfrm>
+            <a:off x="8491094" y="6867733"/>
+            <a:ext cx="180897" cy="215444"/>
+          </a:xfrm>
+          <a:prstGeom prst="rect">
+            <a:avLst/>
+          </a:prstGeom>
+          <a:noFill/>
+        </p:spPr>
+        <p:txBody>
+          <a:bodyPr wrap="square" lIns="0" tIns="0" rIns="0" bIns="0" rtlCol="0">
+            <a:spAutoFit/>
+          </a:bodyPr>
+          <a:lstStyle/>
+          <a:p>
+            <a:r>
+              <a:rPr lang="en-US" sz="1400" dirty="0" err="1">
+                <a:solidFill>
+                  <a:srgbClr val="0070C0"/>
+                </a:solidFill>
+              </a:rPr>
+              <a:t>pl</a:t>
+            </a:r>
+            <a:endParaRPr lang="en-US" sz="1400" dirty="0">
+              <a:solidFill>
+                <a:srgbClr val="0070C0"/>
+              </a:solidFill>
+            </a:endParaRPr>
+          </a:p>
+        </p:txBody>
+      </p:sp>
+      <p:cxnSp>
+        <p:nvCxnSpPr>
+          <p:cNvPr id="157" name="Straight Arrow Connector 156"/>
+          <p:cNvCxnSpPr>
+            <a:cxnSpLocks/>
+          </p:cNvCxnSpPr>
+          <p:nvPr/>
+        </p:nvCxnSpPr>
+        <p:spPr>
+          <a:xfrm>
+            <a:off x="8266302" y="5631379"/>
+            <a:ext cx="3210086" cy="0"/>
+          </a:xfrm>
+          <a:prstGeom prst="straightConnector1">
+            <a:avLst/>
+          </a:prstGeom>
+          <a:ln w="19050">
+            <a:solidFill>
+              <a:srgbClr val="0070C0"/>
+            </a:solidFill>
+            <a:tailEnd type="arrow"/>
+          </a:ln>
+        </p:spPr>
+        <p:style>
+          <a:lnRef idx="1">
+            <a:schemeClr val="accent1"/>
+          </a:lnRef>
+          <a:fillRef idx="0">
+            <a:schemeClr val="accent1"/>
+          </a:fillRef>
+          <a:effectRef idx="0">
+            <a:schemeClr val="accent1"/>
+          </a:effectRef>
+          <a:fontRef idx="minor">
+            <a:schemeClr val="tx1"/>
+          </a:fontRef>
+        </p:style>
+      </p:cxnSp>
+      <p:cxnSp>
+        <p:nvCxnSpPr>
+          <p:cNvPr id="159" name="Straight Arrow Connector 158"/>
+          <p:cNvCxnSpPr/>
+          <p:nvPr/>
+        </p:nvCxnSpPr>
+        <p:spPr>
+          <a:xfrm>
+            <a:off x="8266302" y="5764100"/>
+            <a:ext cx="3210086" cy="0"/>
+          </a:xfrm>
+          <a:prstGeom prst="straightConnector1">
+            <a:avLst/>
+          </a:prstGeom>
+          <a:ln w="19050">
+            <a:solidFill>
+              <a:schemeClr val="accent1"/>
+            </a:solidFill>
+            <a:prstDash val="sysDash"/>
+            <a:headEnd type="arrow" w="med" len="med"/>
+            <a:tailEnd type="none" w="med" len="med"/>
+          </a:ln>
+        </p:spPr>
+        <p:style>
+          <a:lnRef idx="1">
+            <a:schemeClr val="accent1"/>
+          </a:lnRef>
+          <a:fillRef idx="0">
+            <a:schemeClr val="accent1"/>
+          </a:fillRef>
+          <a:effectRef idx="0">
+            <a:schemeClr val="accent1"/>
+          </a:effectRef>
+          <a:fontRef idx="minor">
+            <a:schemeClr val="tx1"/>
+          </a:fontRef>
+        </p:style>
+      </p:cxnSp>
+      <p:sp>
+        <p:nvSpPr>
+          <p:cNvPr id="162" name="TextBox 161"/>
+          <p:cNvSpPr txBox="1"/>
+          <p:nvPr/>
+        </p:nvSpPr>
+        <p:spPr>
+          <a:xfrm>
+            <a:off x="8952708" y="5467145"/>
+            <a:ext cx="2400763" cy="169277"/>
+          </a:xfrm>
+          <a:prstGeom prst="rect">
+            <a:avLst/>
+          </a:prstGeom>
+          <a:noFill/>
+        </p:spPr>
+        <p:txBody>
+          <a:bodyPr wrap="square" lIns="0" tIns="0" rIns="0" bIns="0" rtlCol="0">
+            <a:spAutoFit/>
+          </a:bodyPr>
+          <a:lstStyle/>
+          <a:p>
+            <a:pPr algn="r"/>
+            <a:r>
+              <a:rPr lang="en-US" sz="1100" dirty="0">
+                <a:solidFill>
+                  <a:srgbClr val="0070C0"/>
+                </a:solidFill>
+              </a:rPr>
+              <a:t>tokenize(</a:t>
+            </a:r>
+            <a:r>
+              <a:rPr lang="en-US" sz="1100" dirty="0" err="1">
+                <a:solidFill>
+                  <a:srgbClr val="0070C0"/>
+                </a:solidFill>
+              </a:rPr>
+              <a:t>eachLine</a:t>
+            </a:r>
+            <a:r>
+              <a:rPr lang="en-US" sz="1100" dirty="0">
+                <a:solidFill>
+                  <a:srgbClr val="0070C0"/>
+                </a:solidFill>
+              </a:rPr>
+              <a:t>)</a:t>
+            </a:r>
+            <a:endParaRPr lang="en-US" sz="1100" dirty="0">
+              <a:solidFill>
+                <a:srgbClr val="0070C0"/>
+              </a:solidFill>
+            </a:endParaRPr>
+          </a:p>
+        </p:txBody>
+      </p:sp>
+      <p:sp>
+        <p:nvSpPr>
+          <p:cNvPr id="163" name="Rectangle 162"/>
           <p:cNvSpPr/>
           <p:nvPr/>
         </p:nvSpPr>
         <p:spPr>
           <a:xfrm>
-            <a:off x="4122956" y="8208546"/>
-            <a:ext cx="225304" cy="451442"/>
+            <a:off x="11475303" y="5619204"/>
+            <a:ext cx="137288" cy="144896"/>
           </a:xfrm>
           <a:prstGeom prst="rect">
             <a:avLst/>
@@ -5921,6 +6851,291 @@
           <a:p>
             <a:pPr algn="ctr"/>
             <a:endParaRPr lang="en-SG" sz="1400"/>
+          </a:p>
+        </p:txBody>
+      </p:sp>
+      <p:sp>
+        <p:nvSpPr>
+          <p:cNvPr id="165" name="Rectangle 164"/>
+          <p:cNvSpPr/>
+          <p:nvPr/>
+        </p:nvSpPr>
+        <p:spPr>
+          <a:xfrm>
+            <a:off x="8572431" y="5564301"/>
+            <a:ext cx="683200" cy="261610"/>
+          </a:xfrm>
+          <a:prstGeom prst="rect">
+            <a:avLst/>
+          </a:prstGeom>
+        </p:spPr>
+        <p:txBody>
+          <a:bodyPr wrap="none">
+            <a:spAutoFit/>
+          </a:bodyPr>
+          <a:lstStyle/>
+          <a:p>
+            <a:r>
+              <a:rPr lang="en-US" sz="1100" dirty="0" err="1">
+                <a:solidFill>
+                  <a:srgbClr val="0070C0"/>
+                </a:solidFill>
+              </a:rPr>
+              <a:t>argsMap</a:t>
+            </a:r>
+            <a:endParaRPr lang="en-US" sz="1100" dirty="0"/>
+          </a:p>
+        </p:txBody>
+      </p:sp>
+      <p:sp>
+        <p:nvSpPr>
+          <p:cNvPr id="167" name="Rectangle 166"/>
+          <p:cNvSpPr/>
+          <p:nvPr/>
+        </p:nvSpPr>
+        <p:spPr>
+          <a:xfrm>
+            <a:off x="9861569" y="7617620"/>
+            <a:ext cx="137288" cy="144896"/>
+          </a:xfrm>
+          <a:prstGeom prst="rect">
+            <a:avLst/>
+          </a:prstGeom>
+          <a:solidFill>
+            <a:srgbClr val="0070C0"/>
+          </a:solidFill>
+          <a:ln>
+            <a:solidFill>
+              <a:srgbClr val="0070C0"/>
+            </a:solidFill>
+          </a:ln>
+          <a:effectLst/>
+        </p:spPr>
+        <p:style>
+          <a:lnRef idx="1">
+            <a:schemeClr val="accent3"/>
+          </a:lnRef>
+          <a:fillRef idx="2">
+            <a:schemeClr val="accent3"/>
+          </a:fillRef>
+          <a:effectRef idx="1">
+            <a:schemeClr val="accent3"/>
+          </a:effectRef>
+          <a:fontRef idx="minor">
+            <a:schemeClr val="dk1"/>
+          </a:fontRef>
+        </p:style>
+        <p:txBody>
+          <a:bodyPr rtlCol="0" anchor="ctr"/>
+          <a:lstStyle/>
+          <a:p>
+            <a:pPr algn="ctr"/>
+            <a:endParaRPr lang="en-SG" sz="1400"/>
+          </a:p>
+        </p:txBody>
+      </p:sp>
+      <p:sp>
+        <p:nvSpPr>
+          <p:cNvPr id="169" name="TextBox 168"/>
+          <p:cNvSpPr txBox="1"/>
+          <p:nvPr/>
+        </p:nvSpPr>
+        <p:spPr>
+          <a:xfrm>
+            <a:off x="6116866" y="7710682"/>
+            <a:ext cx="220343" cy="215444"/>
+          </a:xfrm>
+          <a:prstGeom prst="rect">
+            <a:avLst/>
+          </a:prstGeom>
+          <a:noFill/>
+        </p:spPr>
+        <p:txBody>
+          <a:bodyPr wrap="square" lIns="0" tIns="0" rIns="0" bIns="0" rtlCol="0">
+            <a:spAutoFit/>
+          </a:bodyPr>
+          <a:lstStyle>
+            <a:defPPr>
+              <a:defRPr lang="en-US"/>
+            </a:defPPr>
+            <a:lvl1pPr algn="r">
+              <a:defRPr sz="1400">
+                <a:solidFill>
+                  <a:srgbClr val="0070C0"/>
+                </a:solidFill>
+              </a:defRPr>
+            </a:lvl1pPr>
+          </a:lstStyle>
+          <a:p>
+            <a:r>
+              <a:rPr lang="en-US" dirty="0"/>
+              <a:t>m</a:t>
+            </a:r>
+          </a:p>
+        </p:txBody>
+      </p:sp>
+      <p:cxnSp>
+        <p:nvCxnSpPr>
+          <p:cNvPr id="171" name="Straight Arrow Connector 170"/>
+          <p:cNvCxnSpPr/>
+          <p:nvPr/>
+        </p:nvCxnSpPr>
+        <p:spPr>
+          <a:xfrm>
+            <a:off x="5599906" y="7948184"/>
+            <a:ext cx="2351193" cy="0"/>
+          </a:xfrm>
+          <a:prstGeom prst="straightConnector1">
+            <a:avLst/>
+          </a:prstGeom>
+          <a:ln w="19050">
+            <a:solidFill>
+              <a:schemeClr val="accent1"/>
+            </a:solidFill>
+            <a:prstDash val="sysDash"/>
+            <a:headEnd type="arrow" w="med" len="med"/>
+            <a:tailEnd type="none" w="med" len="med"/>
+          </a:ln>
+        </p:spPr>
+        <p:style>
+          <a:lnRef idx="1">
+            <a:schemeClr val="accent1"/>
+          </a:lnRef>
+          <a:fillRef idx="0">
+            <a:schemeClr val="accent1"/>
+          </a:fillRef>
+          <a:effectRef idx="0">
+            <a:schemeClr val="accent1"/>
+          </a:effectRef>
+          <a:fontRef idx="minor">
+            <a:schemeClr val="tx1"/>
+          </a:fontRef>
+        </p:style>
+      </p:cxnSp>
+      <p:sp>
+        <p:nvSpPr>
+          <p:cNvPr id="177" name="Rectangle 176"/>
+          <p:cNvSpPr/>
+          <p:nvPr/>
+        </p:nvSpPr>
+        <p:spPr>
+          <a:xfrm>
+            <a:off x="2932906" y="8918778"/>
+            <a:ext cx="225304" cy="451442"/>
+          </a:xfrm>
+          <a:prstGeom prst="rect">
+            <a:avLst/>
+          </a:prstGeom>
+          <a:solidFill>
+            <a:srgbClr val="0070C0"/>
+          </a:solidFill>
+          <a:ln>
+            <a:solidFill>
+              <a:srgbClr val="0070C0"/>
+            </a:solidFill>
+          </a:ln>
+          <a:effectLst/>
+        </p:spPr>
+        <p:style>
+          <a:lnRef idx="1">
+            <a:schemeClr val="accent3"/>
+          </a:lnRef>
+          <a:fillRef idx="2">
+            <a:schemeClr val="accent3"/>
+          </a:fillRef>
+          <a:effectRef idx="1">
+            <a:schemeClr val="accent3"/>
+          </a:effectRef>
+          <a:fontRef idx="minor">
+            <a:schemeClr val="dk1"/>
+          </a:fontRef>
+        </p:style>
+        <p:txBody>
+          <a:bodyPr rtlCol="0" anchor="ctr"/>
+          <a:lstStyle/>
+          <a:p>
+            <a:pPr algn="ctr"/>
+            <a:endParaRPr lang="en-SG" sz="1400"/>
+          </a:p>
+        </p:txBody>
+      </p:sp>
+      <p:sp>
+        <p:nvSpPr>
+          <p:cNvPr id="179" name="TextBox 178"/>
+          <p:cNvSpPr txBox="1"/>
+          <p:nvPr/>
+        </p:nvSpPr>
+        <p:spPr>
+          <a:xfrm>
+            <a:off x="1561306" y="9154776"/>
+            <a:ext cx="762000" cy="215444"/>
+          </a:xfrm>
+          <a:prstGeom prst="rect">
+            <a:avLst/>
+          </a:prstGeom>
+          <a:noFill/>
+        </p:spPr>
+        <p:txBody>
+          <a:bodyPr wrap="square" lIns="0" tIns="0" rIns="0" bIns="0" rtlCol="0">
+            <a:spAutoFit/>
+          </a:bodyPr>
+          <a:lstStyle>
+            <a:defPPr>
+              <a:defRPr lang="en-US"/>
+            </a:defPPr>
+            <a:lvl1pPr algn="r">
+              <a:defRPr sz="1400">
+                <a:solidFill>
+                  <a:srgbClr val="0070C0"/>
+                </a:solidFill>
+              </a:defRPr>
+            </a:lvl1pPr>
+          </a:lstStyle>
+          <a:p>
+            <a:r>
+              <a:rPr lang="en-US" dirty="0"/>
+              <a:t>result</a:t>
+            </a:r>
+          </a:p>
+        </p:txBody>
+      </p:sp>
+      <p:sp>
+        <p:nvSpPr>
+          <p:cNvPr id="181" name="TextBox 180"/>
+          <p:cNvSpPr txBox="1"/>
+          <p:nvPr/>
+        </p:nvSpPr>
+        <p:spPr>
+          <a:xfrm>
+            <a:off x="8484424" y="7503960"/>
+            <a:ext cx="220343" cy="215444"/>
+          </a:xfrm>
+          <a:prstGeom prst="rect">
+            <a:avLst/>
+          </a:prstGeom>
+          <a:noFill/>
+        </p:spPr>
+        <p:txBody>
+          <a:bodyPr wrap="square" lIns="0" tIns="0" rIns="0" bIns="0" rtlCol="0">
+            <a:spAutoFit/>
+          </a:bodyPr>
+          <a:lstStyle>
+            <a:defPPr>
+              <a:defRPr lang="en-US"/>
+            </a:defPPr>
+            <a:lvl1pPr algn="r">
+              <a:defRPr sz="1400">
+                <a:solidFill>
+                  <a:srgbClr val="0070C0"/>
+                </a:solidFill>
+              </a:defRPr>
+            </a:lvl1pPr>
+          </a:lstStyle>
+          <a:p>
+            <a:r>
+              <a:rPr lang="en-US" dirty="0"/>
+              <a:t>m</a:t>
+            </a:r>
           </a:p>
         </p:txBody>
       </p:sp>

</xml_diff>